<commit_message>
timeline ppt update on march 8th 2017
</commit_message>
<xml_diff>
--- a/Project_Goal/ppts/EASE_Timeline.pptx
+++ b/Project_Goal/ppts/EASE_Timeline.pptx
@@ -243,7 +243,7 @@
           <a:p>
             <a:fld id="{C5164158-0CE9-4349-B3F5-2F2E57F0D0CB}" type="datetimeFigureOut">
               <a:rPr lang="en-US" smtClean="0"/>
-              <a:t>3/6/17</a:t>
+              <a:t>3/8/17</a:t>
             </a:fld>
             <a:endParaRPr lang="en-US" dirty="0"/>
           </a:p>
@@ -420,7 +420,7 @@
           <a:p>
             <a:fld id="{C5164158-0CE9-4349-B3F5-2F2E57F0D0CB}" type="datetimeFigureOut">
               <a:rPr lang="en-US" smtClean="0"/>
-              <a:t>3/6/17</a:t>
+              <a:t>3/8/17</a:t>
             </a:fld>
             <a:endParaRPr lang="en-US" dirty="0"/>
           </a:p>
@@ -600,7 +600,7 @@
           <a:p>
             <a:fld id="{C5164158-0CE9-4349-B3F5-2F2E57F0D0CB}" type="datetimeFigureOut">
               <a:rPr lang="en-US" smtClean="0"/>
-              <a:t>3/6/17</a:t>
+              <a:t>3/8/17</a:t>
             </a:fld>
             <a:endParaRPr lang="en-US" dirty="0"/>
           </a:p>
@@ -770,7 +770,7 @@
           <a:p>
             <a:fld id="{C5164158-0CE9-4349-B3F5-2F2E57F0D0CB}" type="datetimeFigureOut">
               <a:rPr lang="en-US" smtClean="0"/>
-              <a:t>3/6/17</a:t>
+              <a:t>3/8/17</a:t>
             </a:fld>
             <a:endParaRPr lang="en-US" dirty="0"/>
           </a:p>
@@ -1014,7 +1014,7 @@
           <a:p>
             <a:fld id="{C5164158-0CE9-4349-B3F5-2F2E57F0D0CB}" type="datetimeFigureOut">
               <a:rPr lang="en-US" smtClean="0"/>
-              <a:t>3/6/17</a:t>
+              <a:t>3/8/17</a:t>
             </a:fld>
             <a:endParaRPr lang="en-US" dirty="0"/>
           </a:p>
@@ -1246,7 +1246,7 @@
           <a:p>
             <a:fld id="{C5164158-0CE9-4349-B3F5-2F2E57F0D0CB}" type="datetimeFigureOut">
               <a:rPr lang="en-US" smtClean="0"/>
-              <a:t>3/6/17</a:t>
+              <a:t>3/8/17</a:t>
             </a:fld>
             <a:endParaRPr lang="en-US" dirty="0"/>
           </a:p>
@@ -1613,7 +1613,7 @@
           <a:p>
             <a:fld id="{C5164158-0CE9-4349-B3F5-2F2E57F0D0CB}" type="datetimeFigureOut">
               <a:rPr lang="en-US" smtClean="0"/>
-              <a:t>3/6/17</a:t>
+              <a:t>3/8/17</a:t>
             </a:fld>
             <a:endParaRPr lang="en-US" dirty="0"/>
           </a:p>
@@ -1731,7 +1731,7 @@
           <a:p>
             <a:fld id="{C5164158-0CE9-4349-B3F5-2F2E57F0D0CB}" type="datetimeFigureOut">
               <a:rPr lang="en-US" smtClean="0"/>
-              <a:t>3/6/17</a:t>
+              <a:t>3/8/17</a:t>
             </a:fld>
             <a:endParaRPr lang="en-US" dirty="0"/>
           </a:p>
@@ -1826,7 +1826,7 @@
           <a:p>
             <a:fld id="{C5164158-0CE9-4349-B3F5-2F2E57F0D0CB}" type="datetimeFigureOut">
               <a:rPr lang="en-US" smtClean="0"/>
-              <a:t>3/6/17</a:t>
+              <a:t>3/8/17</a:t>
             </a:fld>
             <a:endParaRPr lang="en-US" dirty="0"/>
           </a:p>
@@ -2110,7 +2110,7 @@
           <a:p>
             <a:fld id="{C5164158-0CE9-4349-B3F5-2F2E57F0D0CB}" type="datetimeFigureOut">
               <a:rPr lang="en-US" smtClean="0"/>
-              <a:t>3/6/17</a:t>
+              <a:t>3/8/17</a:t>
             </a:fld>
             <a:endParaRPr lang="en-US" dirty="0"/>
           </a:p>
@@ -2367,7 +2367,7 @@
           <a:p>
             <a:fld id="{C5164158-0CE9-4349-B3F5-2F2E57F0D0CB}" type="datetimeFigureOut">
               <a:rPr lang="en-US" smtClean="0"/>
-              <a:t>3/6/17</a:t>
+              <a:t>3/8/17</a:t>
             </a:fld>
             <a:endParaRPr lang="en-US" dirty="0"/>
           </a:p>
@@ -2580,7 +2580,7 @@
           <a:p>
             <a:fld id="{C5164158-0CE9-4349-B3F5-2F2E57F0D0CB}" type="datetimeFigureOut">
               <a:rPr lang="en-US" smtClean="0"/>
-              <a:t>3/6/17</a:t>
+              <a:t>3/8/17</a:t>
             </a:fld>
             <a:endParaRPr lang="en-US" dirty="0"/>
           </a:p>
@@ -5495,21 +5495,21 @@
       </p:sp>
       <p:grpSp>
         <p:nvGrpSpPr>
-          <p:cNvPr id="52" name="Group 51"/>
+          <p:cNvPr id="24" name="Group 23"/>
           <p:cNvGrpSpPr/>
           <p:nvPr/>
         </p:nvGrpSpPr>
         <p:grpSpPr>
           <a:xfrm>
-            <a:off x="259052" y="1053630"/>
-            <a:ext cx="8676533" cy="4897959"/>
-            <a:chOff x="259052" y="1053630"/>
-            <a:chExt cx="8676533" cy="4897959"/>
+            <a:off x="136501" y="1053630"/>
+            <a:ext cx="8851927" cy="5000280"/>
+            <a:chOff x="136501" y="1053630"/>
+            <a:chExt cx="8851927" cy="5000280"/>
           </a:xfrm>
         </p:grpSpPr>
         <p:cxnSp>
           <p:nvCxnSpPr>
-            <p:cNvPr id="254" name="OTLSHAPE_T_595522e6a4c8437398d8e975e7769937_RightVerticalConnector4"/>
+            <p:cNvPr id="193" name="OTLSHAPE_T_595522e6a4c8437398d8e975e7769937_RightVerticalConnector4"/>
             <p:cNvCxnSpPr/>
             <p:nvPr>
               <p:custDataLst>
@@ -5518,8 +5518,182 @@
             </p:nvPr>
           </p:nvCxnSpPr>
           <p:spPr>
+            <a:xfrm flipH="1">
+              <a:off x="6622767" y="3647872"/>
+              <a:ext cx="2201" cy="992078"/>
+            </a:xfrm>
+            <a:prstGeom prst="line">
+              <a:avLst/>
+            </a:prstGeom>
+            <a:ln w="9525" cap="flat" cmpd="sng" algn="ctr">
+              <a:solidFill>
+                <a:srgbClr val="CCCCCC"/>
+              </a:solidFill>
+              <a:prstDash val="solid"/>
+              <a:miter lim="800000"/>
+              <a:headEnd type="none" w="med" len="med"/>
+              <a:tailEnd type="none" w="med" len="med"/>
+            </a:ln>
+          </p:spPr>
+          <p:style>
+            <a:lnRef idx="1">
+              <a:schemeClr val="accent1"/>
+            </a:lnRef>
+            <a:fillRef idx="0">
+              <a:schemeClr val="accent1"/>
+            </a:fillRef>
+            <a:effectRef idx="0">
+              <a:schemeClr val="accent1"/>
+            </a:effectRef>
+            <a:fontRef idx="minor">
+              <a:schemeClr val="tx1"/>
+            </a:fontRef>
+          </p:style>
+        </p:cxnSp>
+        <p:cxnSp>
+          <p:nvCxnSpPr>
+            <p:cNvPr id="191" name="OTLSHAPE_T_595522e6a4c8437398d8e975e7769937_RightVerticalConnector4"/>
+            <p:cNvCxnSpPr/>
+            <p:nvPr>
+              <p:custDataLst>
+                <p:tags r:id="rId65"/>
+              </p:custDataLst>
+            </p:nvPr>
+          </p:nvCxnSpPr>
+          <p:spPr>
             <a:xfrm>
-              <a:off x="8029320" y="4394497"/>
+              <a:off x="5726603" y="4046074"/>
+              <a:ext cx="0" cy="530376"/>
+            </a:xfrm>
+            <a:prstGeom prst="line">
+              <a:avLst/>
+            </a:prstGeom>
+            <a:ln w="9525" cap="flat" cmpd="sng" algn="ctr">
+              <a:solidFill>
+                <a:srgbClr val="CCCCCC"/>
+              </a:solidFill>
+              <a:prstDash val="solid"/>
+              <a:miter lim="800000"/>
+              <a:headEnd type="none" w="med" len="med"/>
+              <a:tailEnd type="none" w="med" len="med"/>
+            </a:ln>
+          </p:spPr>
+          <p:style>
+            <a:lnRef idx="1">
+              <a:schemeClr val="accent1"/>
+            </a:lnRef>
+            <a:fillRef idx="0">
+              <a:schemeClr val="accent1"/>
+            </a:fillRef>
+            <a:effectRef idx="0">
+              <a:schemeClr val="accent1"/>
+            </a:effectRef>
+            <a:fontRef idx="minor">
+              <a:schemeClr val="tx1"/>
+            </a:fontRef>
+          </p:style>
+        </p:cxnSp>
+        <p:cxnSp>
+          <p:nvCxnSpPr>
+            <p:cNvPr id="186" name="OTLSHAPE_T_595522e6a4c8437398d8e975e7769937_RightVerticalConnector4"/>
+            <p:cNvCxnSpPr>
+              <a:stCxn id="181" idx="1"/>
+            </p:cNvCxnSpPr>
+            <p:nvPr>
+              <p:custDataLst>
+                <p:tags r:id="rId66"/>
+              </p:custDataLst>
+            </p:nvPr>
+          </p:nvCxnSpPr>
+          <p:spPr>
+            <a:xfrm>
+              <a:off x="5726603" y="3670341"/>
+              <a:ext cx="0" cy="116865"/>
+            </a:xfrm>
+            <a:prstGeom prst="line">
+              <a:avLst/>
+            </a:prstGeom>
+            <a:ln w="9525" cap="flat" cmpd="sng" algn="ctr">
+              <a:solidFill>
+                <a:srgbClr val="CCCCCC"/>
+              </a:solidFill>
+              <a:prstDash val="solid"/>
+              <a:miter lim="800000"/>
+              <a:headEnd type="none" w="med" len="med"/>
+              <a:tailEnd type="none" w="med" len="med"/>
+            </a:ln>
+          </p:spPr>
+          <p:style>
+            <a:lnRef idx="1">
+              <a:schemeClr val="accent1"/>
+            </a:lnRef>
+            <a:fillRef idx="0">
+              <a:schemeClr val="accent1"/>
+            </a:fillRef>
+            <a:effectRef idx="0">
+              <a:schemeClr val="accent1"/>
+            </a:effectRef>
+            <a:fontRef idx="minor">
+              <a:schemeClr val="tx1"/>
+            </a:fontRef>
+          </p:style>
+        </p:cxnSp>
+        <p:cxnSp>
+          <p:nvCxnSpPr>
+            <p:cNvPr id="17598" name="OTLSHAPE_T_483bbbf5c83f40fdba3b1ddb997e80eb_LeftVerticalConnector1"/>
+            <p:cNvCxnSpPr/>
+            <p:nvPr>
+              <p:custDataLst>
+                <p:tags r:id="rId67"/>
+              </p:custDataLst>
+            </p:nvPr>
+          </p:nvCxnSpPr>
+          <p:spPr>
+            <a:xfrm>
+              <a:off x="4137744" y="2849250"/>
+              <a:ext cx="0" cy="1727200"/>
+            </a:xfrm>
+            <a:prstGeom prst="line">
+              <a:avLst/>
+            </a:prstGeom>
+            <a:ln w="9525" cap="flat" cmpd="sng" algn="ctr">
+              <a:solidFill>
+                <a:srgbClr val="CCCCCC"/>
+              </a:solidFill>
+              <a:prstDash val="solid"/>
+              <a:miter lim="800000"/>
+              <a:headEnd type="none" w="med" len="med"/>
+              <a:tailEnd type="none" w="med" len="med"/>
+            </a:ln>
+          </p:spPr>
+          <p:style>
+            <a:lnRef idx="1">
+              <a:schemeClr val="accent1"/>
+            </a:lnRef>
+            <a:fillRef idx="0">
+              <a:schemeClr val="accent1"/>
+            </a:fillRef>
+            <a:effectRef idx="0">
+              <a:schemeClr val="accent1"/>
+            </a:effectRef>
+            <a:fontRef idx="minor">
+              <a:schemeClr val="tx1"/>
+            </a:fontRef>
+          </p:style>
+        </p:cxnSp>
+        <p:cxnSp>
+          <p:nvCxnSpPr>
+            <p:cNvPr id="254" name="OTLSHAPE_T_595522e6a4c8437398d8e975e7769937_RightVerticalConnector4"/>
+            <p:cNvCxnSpPr/>
+            <p:nvPr>
+              <p:custDataLst>
+                <p:tags r:id="rId68"/>
+              </p:custDataLst>
+            </p:nvPr>
+          </p:nvCxnSpPr>
+          <p:spPr>
+            <a:xfrm>
+              <a:off x="7297020" y="4417637"/>
               <a:ext cx="1316" cy="171049"/>
             </a:xfrm>
             <a:prstGeom prst="line">
@@ -5552,17 +5726,105 @@
         </p:cxnSp>
         <p:cxnSp>
           <p:nvCxnSpPr>
-            <p:cNvPr id="251" name="OTLSHAPE_T_595522e6a4c8437398d8e975e7769937_RightVerticalConnector4"/>
-            <p:cNvCxnSpPr/>
+            <p:cNvPr id="248" name="OTLSHAPE_T_595522e6a4c8437398d8e975e7769937_RightVerticalConnector4"/>
+            <p:cNvCxnSpPr>
+              <a:stCxn id="244" idx="1"/>
+            </p:cNvCxnSpPr>
             <p:nvPr>
               <p:custDataLst>
-                <p:tags r:id="rId65"/>
+                <p:tags r:id="rId69"/>
               </p:custDataLst>
             </p:nvPr>
           </p:nvCxnSpPr>
           <p:spPr>
             <a:xfrm>
-              <a:off x="7583204" y="4431364"/>
+              <a:off x="5960985" y="3920776"/>
+              <a:ext cx="6674" cy="698070"/>
+            </a:xfrm>
+            <a:prstGeom prst="line">
+              <a:avLst/>
+            </a:prstGeom>
+            <a:ln w="9525" cap="flat" cmpd="sng" algn="ctr">
+              <a:solidFill>
+                <a:srgbClr val="CCCCCC"/>
+              </a:solidFill>
+              <a:prstDash val="solid"/>
+              <a:miter lim="800000"/>
+              <a:headEnd type="none" w="med" len="med"/>
+              <a:tailEnd type="none" w="med" len="med"/>
+            </a:ln>
+          </p:spPr>
+          <p:style>
+            <a:lnRef idx="1">
+              <a:schemeClr val="accent1"/>
+            </a:lnRef>
+            <a:fillRef idx="0">
+              <a:schemeClr val="accent1"/>
+            </a:fillRef>
+            <a:effectRef idx="0">
+              <a:schemeClr val="accent1"/>
+            </a:effectRef>
+            <a:fontRef idx="minor">
+              <a:schemeClr val="tx1"/>
+            </a:fontRef>
+          </p:style>
+        </p:cxnSp>
+        <p:cxnSp>
+          <p:nvCxnSpPr>
+            <p:cNvPr id="246" name="OTLSHAPE_T_595522e6a4c8437398d8e975e7769937_RightVerticalConnector4"/>
+            <p:cNvCxnSpPr/>
+            <p:nvPr>
+              <p:custDataLst>
+                <p:tags r:id="rId70"/>
+              </p:custDataLst>
+            </p:nvPr>
+          </p:nvCxnSpPr>
+          <p:spPr>
+            <a:xfrm flipH="1">
+              <a:off x="6624404" y="3902417"/>
+              <a:ext cx="1648" cy="678506"/>
+            </a:xfrm>
+            <a:prstGeom prst="line">
+              <a:avLst/>
+            </a:prstGeom>
+            <a:ln w="9525" cap="flat" cmpd="sng" algn="ctr">
+              <a:solidFill>
+                <a:srgbClr val="CCCCCC"/>
+              </a:solidFill>
+              <a:prstDash val="solid"/>
+              <a:miter lim="800000"/>
+              <a:headEnd type="none" w="med" len="med"/>
+              <a:tailEnd type="none" w="med" len="med"/>
+            </a:ln>
+          </p:spPr>
+          <p:style>
+            <a:lnRef idx="1">
+              <a:schemeClr val="accent1"/>
+            </a:lnRef>
+            <a:fillRef idx="0">
+              <a:schemeClr val="accent1"/>
+            </a:fillRef>
+            <a:effectRef idx="0">
+              <a:schemeClr val="accent1"/>
+            </a:effectRef>
+            <a:fontRef idx="minor">
+              <a:schemeClr val="tx1"/>
+            </a:fontRef>
+          </p:style>
+        </p:cxnSp>
+        <p:cxnSp>
+          <p:nvCxnSpPr>
+            <p:cNvPr id="243" name="OTLSHAPE_T_595522e6a4c8437398d8e975e7769937_RightVerticalConnector4"/>
+            <p:cNvCxnSpPr/>
+            <p:nvPr>
+              <p:custDataLst>
+                <p:tags r:id="rId71"/>
+              </p:custDataLst>
+            </p:nvPr>
+          </p:nvCxnSpPr>
+          <p:spPr>
+            <a:xfrm>
+              <a:off x="5340694" y="4419439"/>
               <a:ext cx="1316" cy="171049"/>
             </a:xfrm>
             <a:prstGeom prst="line">
@@ -5595,103 +5857,17 @@
         </p:cxnSp>
         <p:cxnSp>
           <p:nvCxnSpPr>
-            <p:cNvPr id="248" name="OTLSHAPE_T_595522e6a4c8437398d8e975e7769937_RightVerticalConnector4"/>
+            <p:cNvPr id="241" name="OTLSHAPE_T_595522e6a4c8437398d8e975e7769937_RightVerticalConnector4"/>
             <p:cNvCxnSpPr/>
             <p:nvPr>
               <p:custDataLst>
-                <p:tags r:id="rId66"/>
+                <p:tags r:id="rId72"/>
               </p:custDataLst>
             </p:nvPr>
           </p:nvCxnSpPr>
           <p:spPr>
             <a:xfrm>
-              <a:off x="6089060" y="3856908"/>
-              <a:ext cx="1150" cy="761938"/>
-            </a:xfrm>
-            <a:prstGeom prst="line">
-              <a:avLst/>
-            </a:prstGeom>
-            <a:ln w="9525" cap="flat" cmpd="sng" algn="ctr">
-              <a:solidFill>
-                <a:srgbClr val="CCCCCC"/>
-              </a:solidFill>
-              <a:prstDash val="solid"/>
-              <a:miter lim="800000"/>
-              <a:headEnd type="none" w="med" len="med"/>
-              <a:tailEnd type="none" w="med" len="med"/>
-            </a:ln>
-          </p:spPr>
-          <p:style>
-            <a:lnRef idx="1">
-              <a:schemeClr val="accent1"/>
-            </a:lnRef>
-            <a:fillRef idx="0">
-              <a:schemeClr val="accent1"/>
-            </a:fillRef>
-            <a:effectRef idx="0">
-              <a:schemeClr val="accent1"/>
-            </a:effectRef>
-            <a:fontRef idx="minor">
-              <a:schemeClr val="tx1"/>
-            </a:fontRef>
-          </p:style>
-        </p:cxnSp>
-        <p:cxnSp>
-          <p:nvCxnSpPr>
-            <p:cNvPr id="246" name="OTLSHAPE_T_595522e6a4c8437398d8e975e7769937_RightVerticalConnector4"/>
-            <p:cNvCxnSpPr/>
-            <p:nvPr>
-              <p:custDataLst>
-                <p:tags r:id="rId67"/>
-              </p:custDataLst>
-            </p:nvPr>
-          </p:nvCxnSpPr>
-          <p:spPr>
-            <a:xfrm flipH="1">
-              <a:off x="6746955" y="3902417"/>
-              <a:ext cx="1648" cy="678506"/>
-            </a:xfrm>
-            <a:prstGeom prst="line">
-              <a:avLst/>
-            </a:prstGeom>
-            <a:ln w="9525" cap="flat" cmpd="sng" algn="ctr">
-              <a:solidFill>
-                <a:srgbClr val="CCCCCC"/>
-              </a:solidFill>
-              <a:prstDash val="solid"/>
-              <a:miter lim="800000"/>
-              <a:headEnd type="none" w="med" len="med"/>
-              <a:tailEnd type="none" w="med" len="med"/>
-            </a:ln>
-          </p:spPr>
-          <p:style>
-            <a:lnRef idx="1">
-              <a:schemeClr val="accent1"/>
-            </a:lnRef>
-            <a:fillRef idx="0">
-              <a:schemeClr val="accent1"/>
-            </a:fillRef>
-            <a:effectRef idx="0">
-              <a:schemeClr val="accent1"/>
-            </a:effectRef>
-            <a:fontRef idx="minor">
-              <a:schemeClr val="tx1"/>
-            </a:fontRef>
-          </p:style>
-        </p:cxnSp>
-        <p:cxnSp>
-          <p:nvCxnSpPr>
-            <p:cNvPr id="243" name="OTLSHAPE_T_595522e6a4c8437398d8e975e7769937_RightVerticalConnector4"/>
-            <p:cNvCxnSpPr/>
-            <p:nvPr>
-              <p:custDataLst>
-                <p:tags r:id="rId68"/>
-              </p:custDataLst>
-            </p:nvPr>
-          </p:nvCxnSpPr>
-          <p:spPr>
-            <a:xfrm>
-              <a:off x="5463245" y="4419439"/>
+              <a:off x="5966448" y="4445165"/>
               <a:ext cx="1316" cy="171049"/>
             </a:xfrm>
             <a:prstGeom prst="line">
@@ -5724,60 +5900,17 @@
         </p:cxnSp>
         <p:cxnSp>
           <p:nvCxnSpPr>
-            <p:cNvPr id="241" name="OTLSHAPE_T_595522e6a4c8437398d8e975e7769937_RightVerticalConnector4"/>
+            <p:cNvPr id="240" name="OTLSHAPE_T_595522e6a4c8437398d8e975e7769937_RightVerticalConnector4"/>
             <p:cNvCxnSpPr/>
             <p:nvPr>
               <p:custDataLst>
-                <p:tags r:id="rId69"/>
+                <p:tags r:id="rId73"/>
               </p:custDataLst>
             </p:nvPr>
           </p:nvCxnSpPr>
           <p:spPr>
             <a:xfrm>
-              <a:off x="6088999" y="4445165"/>
-              <a:ext cx="1316" cy="171049"/>
-            </a:xfrm>
-            <a:prstGeom prst="line">
-              <a:avLst/>
-            </a:prstGeom>
-            <a:ln w="9525" cap="flat" cmpd="sng" algn="ctr">
-              <a:solidFill>
-                <a:srgbClr val="CCCCCC"/>
-              </a:solidFill>
-              <a:prstDash val="solid"/>
-              <a:miter lim="800000"/>
-              <a:headEnd type="none" w="med" len="med"/>
-              <a:tailEnd type="none" w="med" len="med"/>
-            </a:ln>
-          </p:spPr>
-          <p:style>
-            <a:lnRef idx="1">
-              <a:schemeClr val="accent1"/>
-            </a:lnRef>
-            <a:fillRef idx="0">
-              <a:schemeClr val="accent1"/>
-            </a:fillRef>
-            <a:effectRef idx="0">
-              <a:schemeClr val="accent1"/>
-            </a:effectRef>
-            <a:fontRef idx="minor">
-              <a:schemeClr val="tx1"/>
-            </a:fontRef>
-          </p:style>
-        </p:cxnSp>
-        <p:cxnSp>
-          <p:nvCxnSpPr>
-            <p:cNvPr id="240" name="OTLSHAPE_T_595522e6a4c8437398d8e975e7769937_RightVerticalConnector4"/>
-            <p:cNvCxnSpPr/>
-            <p:nvPr>
-              <p:custDataLst>
-                <p:tags r:id="rId70"/>
-              </p:custDataLst>
-            </p:nvPr>
-          </p:nvCxnSpPr>
-          <p:spPr>
-            <a:xfrm>
-              <a:off x="7420691" y="4167542"/>
+              <a:off x="7298140" y="4167542"/>
               <a:ext cx="1316" cy="398202"/>
             </a:xfrm>
             <a:prstGeom prst="line">
@@ -5814,13 +5947,13 @@
             <p:cNvCxnSpPr/>
             <p:nvPr>
               <p:custDataLst>
-                <p:tags r:id="rId71"/>
+                <p:tags r:id="rId74"/>
               </p:custDataLst>
             </p:nvPr>
           </p:nvCxnSpPr>
           <p:spPr>
             <a:xfrm>
-              <a:off x="6745318" y="2825656"/>
+              <a:off x="6622767" y="2825656"/>
               <a:ext cx="0" cy="1777193"/>
             </a:xfrm>
             <a:prstGeom prst="line">
@@ -5857,13 +5990,13 @@
             <p:cNvCxnSpPr/>
             <p:nvPr>
               <p:custDataLst>
-                <p:tags r:id="rId72"/>
+                <p:tags r:id="rId75"/>
               </p:custDataLst>
             </p:nvPr>
           </p:nvCxnSpPr>
           <p:spPr>
             <a:xfrm>
-              <a:off x="6745318" y="2811087"/>
+              <a:off x="6622767" y="2811087"/>
               <a:ext cx="0" cy="286496"/>
             </a:xfrm>
             <a:prstGeom prst="line">
@@ -5902,14 +6035,14 @@
             </p:cNvCxnSpPr>
             <p:nvPr>
               <p:custDataLst>
-                <p:tags r:id="rId73"/>
+                <p:tags r:id="rId76"/>
               </p:custDataLst>
             </p:nvPr>
           </p:nvCxnSpPr>
           <p:spPr>
             <a:xfrm>
-              <a:off x="6306678" y="2947075"/>
-              <a:ext cx="0" cy="174417"/>
+              <a:off x="6181651" y="2940092"/>
+              <a:ext cx="0" cy="181747"/>
             </a:xfrm>
             <a:prstGeom prst="line">
               <a:avLst/>
@@ -5939,110 +6072,19 @@
             </a:fontRef>
           </p:style>
         </p:cxnSp>
-        <p:sp>
-          <p:nvSpPr>
-            <p:cNvPr id="229" name="OTLSHAPE_T_483bbbf5c83f40fdba3b1ddb997e80eb_Shape"/>
-            <p:cNvSpPr/>
-            <p:nvPr>
-              <p:custDataLst>
-                <p:tags r:id="rId74"/>
-              </p:custDataLst>
-            </p:nvPr>
-          </p:nvSpPr>
-          <p:spPr>
-            <a:xfrm>
-              <a:off x="6297975" y="3022235"/>
-              <a:ext cx="458148" cy="205806"/>
-            </a:xfrm>
-            <a:prstGeom prst="roundRect">
-              <a:avLst>
-                <a:gd name="adj" fmla="val 100000"/>
-              </a:avLst>
-            </a:prstGeom>
-            <a:solidFill>
-              <a:srgbClr val="1C5B81"/>
-            </a:solidFill>
-            <a:ln w="12700" cap="flat" cmpd="sng" algn="ctr">
-              <a:noFill/>
-              <a:prstDash val="solid"/>
-              <a:miter lim="800000"/>
-            </a:ln>
-            <a:effectLst/>
-            <a:scene3d>
-              <a:camera prst="orthographicFront"/>
-              <a:lightRig rig="balanced" dir="t">
-                <a:rot lat="0" lon="0" rev="8700000"/>
-              </a:lightRig>
-            </a:scene3d>
-            <a:sp3d>
-              <a:bevelT w="165100" h="12700"/>
-            </a:sp3d>
-            <a:extLst>
-              <a:ext uri="{91240B29-F687-4F45-9708-019B960494DF}">
-                <a14:hiddenLine xmlns:a14="http://schemas.microsoft.com/office/drawing/2010/main" w="12700" cap="flat" cmpd="sng" algn="ctr">
-                  <a:solidFill>
-                    <a:schemeClr val="accent1">
-                      <a:shade val="50000"/>
-                    </a:schemeClr>
-                  </a:solidFill>
-                  <a:prstDash val="solid"/>
-                  <a:miter lim="800000"/>
-                </a14:hiddenLine>
-              </a:ext>
-              <a:ext uri="{AF507438-7753-43E0-B8FC-AC1667EBCBE1}">
-                <a14:hiddenEffects xmlns:a14="http://schemas.microsoft.com/office/drawing/2010/main">
-                  <a:effectLst>
-                    <a:outerShdw>
-                      <a:scrgbClr r="0" g="0" b="0">
-                        <a:alpha val="50000"/>
-                      </a:scrgbClr>
-                    </a:outerShdw>
-                  </a:effectLst>
-                </a14:hiddenEffects>
-              </a:ext>
-              <a:ext uri="{53640926-AAD7-44D8-BBD7-CCE9431645EC}">
-                <a14:shadowObscured xmlns:a14="http://schemas.microsoft.com/office/drawing/2010/main" val="1"/>
-              </a:ext>
-            </a:extLst>
-          </p:spPr>
-          <p:style>
-            <a:lnRef idx="2">
-              <a:schemeClr val="accent1">
-                <a:shade val="50000"/>
-              </a:schemeClr>
-            </a:lnRef>
-            <a:fillRef idx="1">
-              <a:schemeClr val="accent1"/>
-            </a:fillRef>
-            <a:effectRef idx="0">
-              <a:schemeClr val="accent1"/>
-            </a:effectRef>
-            <a:fontRef idx="minor">
-              <a:schemeClr val="lt1"/>
-            </a:fontRef>
-          </p:style>
-          <p:txBody>
-            <a:bodyPr rtlCol="0" anchor="ctr"/>
-            <a:lstStyle/>
-            <a:p>
-              <a:pPr algn="ctr"/>
-              <a:endParaRPr lang="en-US"/>
-            </a:p>
-          </p:txBody>
-        </p:sp>
         <p:cxnSp>
           <p:nvCxnSpPr>
             <p:cNvPr id="17605" name="OTLSHAPE_T_f6ce9139817b4340b0dc2640e2beede1_LeftVerticalConnector1"/>
             <p:cNvCxnSpPr/>
             <p:nvPr>
               <p:custDataLst>
-                <p:tags r:id="rId75"/>
+                <p:tags r:id="rId77"/>
               </p:custDataLst>
             </p:nvPr>
           </p:nvCxnSpPr>
           <p:spPr>
             <a:xfrm>
-              <a:off x="4565964" y="2620650"/>
+              <a:off x="4443413" y="2620650"/>
               <a:ext cx="0" cy="1955800"/>
             </a:xfrm>
             <a:prstGeom prst="line">
@@ -6079,13 +6121,13 @@
             <p:cNvSpPr/>
             <p:nvPr>
               <p:custDataLst>
-                <p:tags r:id="rId76"/>
+                <p:tags r:id="rId78"/>
               </p:custDataLst>
             </p:nvPr>
           </p:nvSpPr>
           <p:spPr>
             <a:xfrm>
-              <a:off x="4260296" y="2729615"/>
+              <a:off x="4137745" y="2729615"/>
               <a:ext cx="2494353" cy="214524"/>
             </a:xfrm>
             <a:prstGeom prst="roundRect">
@@ -6172,14 +6214,14 @@
             </p:cNvCxnSpPr>
             <p:nvPr>
               <p:custDataLst>
-                <p:tags r:id="rId77"/>
+                <p:tags r:id="rId79"/>
               </p:custDataLst>
             </p:nvPr>
           </p:nvCxnSpPr>
           <p:spPr>
-            <a:xfrm flipH="1">
-              <a:off x="7582856" y="3535581"/>
-              <a:ext cx="3478" cy="1052699"/>
+            <a:xfrm>
+              <a:off x="7294383" y="3375833"/>
+              <a:ext cx="1102" cy="1040869"/>
             </a:xfrm>
             <a:prstGeom prst="line">
               <a:avLst/>
@@ -6217,13 +6259,13 @@
             </p:cNvCxnSpPr>
             <p:nvPr>
               <p:custDataLst>
-                <p:tags r:id="rId78"/>
+                <p:tags r:id="rId80"/>
               </p:custDataLst>
             </p:nvPr>
           </p:nvCxnSpPr>
           <p:spPr>
             <a:xfrm>
-              <a:off x="6750060" y="3535581"/>
+              <a:off x="6624628" y="3375833"/>
               <a:ext cx="0" cy="1052699"/>
             </a:xfrm>
             <a:prstGeom prst="line">
@@ -6256,62 +6298,19 @@
         </p:cxnSp>
         <p:cxnSp>
           <p:nvCxnSpPr>
-            <p:cNvPr id="17598" name="OTLSHAPE_T_483bbbf5c83f40fdba3b1ddb997e80eb_LeftVerticalConnector1"/>
-            <p:cNvCxnSpPr/>
-            <p:nvPr>
-              <p:custDataLst>
-                <p:tags r:id="rId79"/>
-              </p:custDataLst>
-            </p:nvPr>
-          </p:nvCxnSpPr>
-          <p:spPr>
-            <a:xfrm>
-              <a:off x="4260295" y="2849250"/>
-              <a:ext cx="0" cy="1727200"/>
-            </a:xfrm>
-            <a:prstGeom prst="line">
-              <a:avLst/>
-            </a:prstGeom>
-            <a:ln w="9525" cap="flat" cmpd="sng" algn="ctr">
-              <a:solidFill>
-                <a:srgbClr val="CCCCCC"/>
-              </a:solidFill>
-              <a:prstDash val="solid"/>
-              <a:miter lim="800000"/>
-              <a:headEnd type="none" w="med" len="med"/>
-              <a:tailEnd type="none" w="med" len="med"/>
-            </a:ln>
-          </p:spPr>
-          <p:style>
-            <a:lnRef idx="1">
-              <a:schemeClr val="accent1"/>
-            </a:lnRef>
-            <a:fillRef idx="0">
-              <a:schemeClr val="accent1"/>
-            </a:fillRef>
-            <a:effectRef idx="0">
-              <a:schemeClr val="accent1"/>
-            </a:effectRef>
-            <a:fontRef idx="minor">
-              <a:schemeClr val="tx1"/>
-            </a:fontRef>
-          </p:style>
-        </p:cxnSp>
-        <p:cxnSp>
-          <p:nvCxnSpPr>
             <p:cNvPr id="17588" name="OTLSHAPE_T_aee3cd237e094d08996d195632a47ed6_RightVerticalConnector3"/>
             <p:cNvCxnSpPr>
               <a:stCxn id="182" idx="3"/>
             </p:cNvCxnSpPr>
             <p:nvPr>
               <p:custDataLst>
-                <p:tags r:id="rId80"/>
+                <p:tags r:id="rId81"/>
               </p:custDataLst>
             </p:nvPr>
           </p:nvCxnSpPr>
           <p:spPr>
             <a:xfrm>
-              <a:off x="4070193" y="2468334"/>
+              <a:off x="3947642" y="2468334"/>
               <a:ext cx="0" cy="2108116"/>
             </a:xfrm>
             <a:prstGeom prst="line">
@@ -6350,13 +6349,13 @@
             </p:cNvCxnSpPr>
             <p:nvPr>
               <p:custDataLst>
-                <p:tags r:id="rId81"/>
+                <p:tags r:id="rId82"/>
               </p:custDataLst>
             </p:nvPr>
           </p:nvCxnSpPr>
           <p:spPr>
             <a:xfrm>
-              <a:off x="3399078" y="2468334"/>
+              <a:off x="3276527" y="2468334"/>
               <a:ext cx="4760" cy="2171616"/>
             </a:xfrm>
             <a:prstGeom prst="line">
@@ -6395,13 +6394,13 @@
             </p:cNvCxnSpPr>
             <p:nvPr>
               <p:custDataLst>
-                <p:tags r:id="rId82"/>
+                <p:tags r:id="rId83"/>
               </p:custDataLst>
             </p:nvPr>
           </p:nvCxnSpPr>
           <p:spPr>
             <a:xfrm flipH="1">
-              <a:off x="2905897" y="1678284"/>
+              <a:off x="2783346" y="1678284"/>
               <a:ext cx="12172" cy="2904087"/>
             </a:xfrm>
             <a:prstGeom prst="line">
@@ -6438,13 +6437,13 @@
             <p:cNvCxnSpPr/>
             <p:nvPr>
               <p:custDataLst>
-                <p:tags r:id="rId83"/>
+                <p:tags r:id="rId84"/>
               </p:custDataLst>
             </p:nvPr>
           </p:nvCxnSpPr>
           <p:spPr>
             <a:xfrm>
-              <a:off x="2560186" y="2061850"/>
+              <a:off x="2437635" y="2061850"/>
               <a:ext cx="0" cy="2514600"/>
             </a:xfrm>
             <a:prstGeom prst="line">
@@ -6481,13 +6480,13 @@
             <p:cNvCxnSpPr/>
             <p:nvPr>
               <p:custDataLst>
-                <p:tags r:id="rId84"/>
+                <p:tags r:id="rId85"/>
               </p:custDataLst>
             </p:nvPr>
           </p:nvCxnSpPr>
           <p:spPr>
             <a:xfrm>
-              <a:off x="2077507" y="4178248"/>
+              <a:off x="1954956" y="4178248"/>
               <a:ext cx="1316" cy="398202"/>
             </a:xfrm>
             <a:prstGeom prst="line">
@@ -6524,13 +6523,13 @@
             <p:cNvSpPr/>
             <p:nvPr>
               <p:custDataLst>
-                <p:tags r:id="rId85"/>
+                <p:tags r:id="rId86"/>
               </p:custDataLst>
             </p:nvPr>
           </p:nvSpPr>
           <p:spPr>
             <a:xfrm>
-              <a:off x="2066868" y="4065319"/>
+              <a:off x="1944317" y="4065319"/>
               <a:ext cx="5358896" cy="208322"/>
             </a:xfrm>
             <a:prstGeom prst="roundRect">
@@ -6615,13 +6614,13 @@
             <p:cNvCxnSpPr/>
             <p:nvPr>
               <p:custDataLst>
-                <p:tags r:id="rId86"/>
+                <p:tags r:id="rId87"/>
               </p:custDataLst>
             </p:nvPr>
           </p:nvCxnSpPr>
           <p:spPr>
             <a:xfrm>
-              <a:off x="1361768" y="1799992"/>
+              <a:off x="1239217" y="1799992"/>
               <a:ext cx="0" cy="2776458"/>
             </a:xfrm>
             <a:prstGeom prst="line">
@@ -6658,13 +6657,13 @@
             <p:cNvCxnSpPr/>
             <p:nvPr>
               <p:custDataLst>
-                <p:tags r:id="rId87"/>
+                <p:tags r:id="rId88"/>
               </p:custDataLst>
             </p:nvPr>
           </p:nvCxnSpPr>
           <p:spPr>
             <a:xfrm>
-              <a:off x="1098116" y="1678284"/>
+              <a:off x="975565" y="1678284"/>
               <a:ext cx="0" cy="2898166"/>
             </a:xfrm>
             <a:prstGeom prst="line">
@@ -6701,13 +6700,13 @@
             <p:cNvCxnSpPr/>
             <p:nvPr>
               <p:custDataLst>
-                <p:tags r:id="rId88"/>
+                <p:tags r:id="rId89"/>
               </p:custDataLst>
             </p:nvPr>
           </p:nvCxnSpPr>
           <p:spPr>
             <a:xfrm>
-              <a:off x="726606" y="1299850"/>
+              <a:off x="604055" y="1299850"/>
               <a:ext cx="0" cy="3276600"/>
             </a:xfrm>
             <a:prstGeom prst="line">
@@ -6744,13 +6743,13 @@
             <p:cNvSpPr/>
             <p:nvPr>
               <p:custDataLst>
-                <p:tags r:id="rId89"/>
+                <p:tags r:id="rId90"/>
               </p:custDataLst>
             </p:nvPr>
           </p:nvSpPr>
           <p:spPr>
             <a:xfrm>
-              <a:off x="549522" y="4576450"/>
+              <a:off x="426971" y="4576450"/>
               <a:ext cx="7721600" cy="381000"/>
             </a:xfrm>
             <a:prstGeom prst="roundRect">
@@ -6834,13 +6833,13 @@
             </p:cNvCxnSpPr>
             <p:nvPr>
               <p:custDataLst>
-                <p:tags r:id="rId90"/>
+                <p:tags r:id="rId91"/>
               </p:custDataLst>
             </p:nvPr>
           </p:nvCxnSpPr>
           <p:spPr>
             <a:xfrm flipH="1">
-              <a:off x="4565964" y="2024837"/>
+              <a:off x="4443413" y="2024837"/>
               <a:ext cx="1" cy="246953"/>
             </a:xfrm>
             <a:prstGeom prst="line">
@@ -6877,13 +6876,13 @@
             <p:cNvCxnSpPr/>
             <p:nvPr>
               <p:custDataLst>
-                <p:tags r:id="rId91"/>
+                <p:tags r:id="rId92"/>
               </p:custDataLst>
             </p:nvPr>
           </p:nvCxnSpPr>
           <p:spPr>
             <a:xfrm>
-              <a:off x="1361768" y="1299850"/>
+              <a:off x="1239217" y="1299850"/>
               <a:ext cx="0" cy="548612"/>
             </a:xfrm>
             <a:prstGeom prst="line">
@@ -6920,13 +6919,13 @@
             <p:cNvSpPr/>
             <p:nvPr>
               <p:custDataLst>
-                <p:tags r:id="rId92"/>
+                <p:tags r:id="rId93"/>
               </p:custDataLst>
             </p:nvPr>
           </p:nvSpPr>
           <p:spPr>
             <a:xfrm>
-              <a:off x="726606" y="1198250"/>
+              <a:off x="604055" y="1198250"/>
               <a:ext cx="647700" cy="203200"/>
             </a:xfrm>
             <a:prstGeom prst="roundRect">
@@ -7011,13 +7010,13 @@
             <p:cNvSpPr txBox="1"/>
             <p:nvPr>
               <p:custDataLst>
-                <p:tags r:id="rId93"/>
+                <p:tags r:id="rId94"/>
               </p:custDataLst>
             </p:nvPr>
           </p:nvSpPr>
           <p:spPr>
             <a:xfrm>
-              <a:off x="1412568" y="1053630"/>
+              <a:off x="1290017" y="1053630"/>
               <a:ext cx="3153396" cy="492443"/>
             </a:xfrm>
             <a:prstGeom prst="rect">
@@ -7068,16 +7067,7 @@
                   </a:solidFill>
                   <a:latin typeface="Calibri" panose="020F0502020204030204" pitchFamily="34" charset="0"/>
                 </a:rPr>
-                <a:t>Recruited members</a:t>
-              </a:r>
-              <a:r>
-                <a:rPr lang="en-US" sz="700" b="1" spc="-6" dirty="0" smtClean="0">
-                  <a:solidFill>
-                    <a:srgbClr val="59944D"/>
-                  </a:solidFill>
-                  <a:latin typeface="Calibri" panose="020F0502020204030204" pitchFamily="34" charset="0"/>
-                </a:rPr>
-                <a:t> (</a:t>
+                <a:t>Recruited members (</a:t>
               </a:r>
               <a:r>
                 <a:rPr lang="en-US" sz="700" b="1" spc="-6" dirty="0" err="1" smtClean="0">
@@ -7172,13 +7162,13 @@
             <p:cNvSpPr txBox="1"/>
             <p:nvPr>
               <p:custDataLst>
-                <p:tags r:id="rId94"/>
+                <p:tags r:id="rId95"/>
               </p:custDataLst>
             </p:nvPr>
           </p:nvSpPr>
           <p:spPr>
             <a:xfrm>
-              <a:off x="845898" y="1222338"/>
+              <a:off x="723347" y="1222338"/>
               <a:ext cx="406400" cy="155025"/>
             </a:xfrm>
             <a:prstGeom prst="rect">
@@ -7217,13 +7207,13 @@
             <p:cNvSpPr txBox="1"/>
             <p:nvPr>
               <p:custDataLst>
-                <p:tags r:id="rId95"/>
+                <p:tags r:id="rId96"/>
               </p:custDataLst>
             </p:nvPr>
           </p:nvSpPr>
           <p:spPr>
             <a:xfrm>
-              <a:off x="1301297" y="1552538"/>
+              <a:off x="1178746" y="1552538"/>
               <a:ext cx="406400" cy="155025"/>
             </a:xfrm>
             <a:prstGeom prst="rect">
@@ -7262,13 +7252,13 @@
             <p:cNvSpPr/>
             <p:nvPr>
               <p:custDataLst>
-                <p:tags r:id="rId96"/>
+                <p:tags r:id="rId97"/>
               </p:custDataLst>
             </p:nvPr>
           </p:nvSpPr>
           <p:spPr>
             <a:xfrm>
-              <a:off x="2560187" y="1923237"/>
+              <a:off x="2437636" y="1923237"/>
               <a:ext cx="2005778" cy="203200"/>
             </a:xfrm>
             <a:prstGeom prst="roundRect">
@@ -7353,13 +7343,13 @@
             <p:cNvSpPr txBox="1"/>
             <p:nvPr>
               <p:custDataLst>
-                <p:tags r:id="rId97"/>
+                <p:tags r:id="rId98"/>
               </p:custDataLst>
             </p:nvPr>
           </p:nvSpPr>
           <p:spPr>
             <a:xfrm>
-              <a:off x="4614011" y="1848462"/>
+              <a:off x="4491460" y="1848462"/>
               <a:ext cx="2695384" cy="384721"/>
             </a:xfrm>
             <a:prstGeom prst="rect">
@@ -7436,13 +7426,13 @@
             <p:cNvSpPr txBox="1"/>
             <p:nvPr>
               <p:custDataLst>
-                <p:tags r:id="rId98"/>
+                <p:tags r:id="rId99"/>
               </p:custDataLst>
             </p:nvPr>
           </p:nvSpPr>
           <p:spPr>
             <a:xfrm>
-              <a:off x="3325570" y="1937452"/>
+              <a:off x="3203019" y="1937452"/>
               <a:ext cx="469900" cy="155025"/>
             </a:xfrm>
             <a:prstGeom prst="rect">
@@ -7481,13 +7471,13 @@
             <p:cNvSpPr txBox="1"/>
             <p:nvPr>
               <p:custDataLst>
-                <p:tags r:id="rId99"/>
+                <p:tags r:id="rId100"/>
               </p:custDataLst>
             </p:nvPr>
           </p:nvSpPr>
           <p:spPr>
             <a:xfrm>
-              <a:off x="6818150" y="2610383"/>
+              <a:off x="6695599" y="2610383"/>
               <a:ext cx="1695588" cy="446276"/>
             </a:xfrm>
             <a:prstGeom prst="rect">
@@ -7573,13 +7563,13 @@
             <p:cNvSpPr txBox="1"/>
             <p:nvPr>
               <p:custDataLst>
-                <p:tags r:id="rId100"/>
+                <p:tags r:id="rId101"/>
               </p:custDataLst>
             </p:nvPr>
           </p:nvSpPr>
           <p:spPr>
             <a:xfrm>
-              <a:off x="5267888" y="2748712"/>
+              <a:off x="5145337" y="2748712"/>
               <a:ext cx="424188" cy="153888"/>
             </a:xfrm>
             <a:prstGeom prst="rect">
@@ -7627,14 +7617,14 @@
             <p:cNvSpPr/>
             <p:nvPr>
               <p:custDataLst>
-                <p:tags r:id="rId101"/>
+                <p:tags r:id="rId102"/>
               </p:custDataLst>
             </p:nvPr>
           </p:nvSpPr>
           <p:spPr>
             <a:xfrm>
-              <a:off x="6750060" y="3429174"/>
-              <a:ext cx="836274" cy="212814"/>
+              <a:off x="6624628" y="3269426"/>
+              <a:ext cx="669755" cy="212814"/>
             </a:xfrm>
             <a:prstGeom prst="roundRect">
               <a:avLst>
@@ -7698,13 +7688,13 @@
             <p:cNvSpPr txBox="1"/>
             <p:nvPr>
               <p:custDataLst>
-                <p:tags r:id="rId102"/>
+                <p:tags r:id="rId103"/>
               </p:custDataLst>
             </p:nvPr>
           </p:nvSpPr>
           <p:spPr>
             <a:xfrm>
-              <a:off x="6133026" y="4366794"/>
+              <a:off x="6010475" y="4366794"/>
               <a:ext cx="787400" cy="107722"/>
             </a:xfrm>
             <a:prstGeom prst="rect">
@@ -7742,13 +7732,13 @@
             <p:cNvSpPr/>
             <p:nvPr>
               <p:custDataLst>
-                <p:tags r:id="rId103"/>
+                <p:tags r:id="rId104"/>
               </p:custDataLst>
             </p:nvPr>
           </p:nvSpPr>
           <p:spPr>
             <a:xfrm>
-              <a:off x="1098116" y="1576684"/>
+              <a:off x="975565" y="1576684"/>
               <a:ext cx="1819953" cy="203200"/>
             </a:xfrm>
             <a:prstGeom prst="roundRect">
@@ -7833,13 +7823,13 @@
             <p:cNvSpPr txBox="1"/>
             <p:nvPr>
               <p:custDataLst>
-                <p:tags r:id="rId104"/>
+                <p:tags r:id="rId105"/>
               </p:custDataLst>
             </p:nvPr>
           </p:nvSpPr>
           <p:spPr>
             <a:xfrm>
-              <a:off x="1807275" y="1604016"/>
+              <a:off x="1684724" y="1604016"/>
               <a:ext cx="406400" cy="155025"/>
             </a:xfrm>
             <a:prstGeom prst="rect">
@@ -7878,13 +7868,13 @@
             <p:cNvSpPr txBox="1"/>
             <p:nvPr>
               <p:custDataLst>
-                <p:tags r:id="rId105"/>
+                <p:tags r:id="rId106"/>
               </p:custDataLst>
             </p:nvPr>
           </p:nvSpPr>
           <p:spPr>
             <a:xfrm>
-              <a:off x="2993640" y="1522993"/>
+              <a:off x="2871089" y="1522993"/>
               <a:ext cx="3153396" cy="276999"/>
             </a:xfrm>
             <a:prstGeom prst="rect">
@@ -7931,13 +7921,13 @@
             <p:cNvSpPr/>
             <p:nvPr>
               <p:custDataLst>
-                <p:tags r:id="rId106"/>
+                <p:tags r:id="rId107"/>
               </p:custDataLst>
             </p:nvPr>
           </p:nvSpPr>
           <p:spPr>
             <a:xfrm>
-              <a:off x="3399078" y="2366734"/>
+              <a:off x="3276527" y="2366734"/>
               <a:ext cx="671115" cy="203200"/>
             </a:xfrm>
             <a:prstGeom prst="roundRect">
@@ -8022,13 +8012,13 @@
             <p:cNvSpPr txBox="1"/>
             <p:nvPr>
               <p:custDataLst>
-                <p:tags r:id="rId107"/>
+                <p:tags r:id="rId108"/>
               </p:custDataLst>
             </p:nvPr>
           </p:nvSpPr>
           <p:spPr>
             <a:xfrm>
-              <a:off x="3496944" y="2386295"/>
+              <a:off x="3374393" y="2386295"/>
               <a:ext cx="469900" cy="155025"/>
             </a:xfrm>
             <a:prstGeom prst="rect">
@@ -8076,13 +8066,13 @@
             <p:cNvSpPr txBox="1"/>
             <p:nvPr>
               <p:custDataLst>
-                <p:tags r:id="rId108"/>
+                <p:tags r:id="rId109"/>
               </p:custDataLst>
             </p:nvPr>
           </p:nvSpPr>
           <p:spPr>
             <a:xfrm>
-              <a:off x="4128229" y="2314030"/>
+              <a:off x="4005678" y="2314030"/>
               <a:ext cx="2840860" cy="276999"/>
             </a:xfrm>
             <a:prstGeom prst="rect">
@@ -8144,13 +8134,13 @@
             <p:cNvSpPr/>
             <p:nvPr>
               <p:custDataLst>
-                <p:tags r:id="rId109"/>
+                <p:tags r:id="rId110"/>
               </p:custDataLst>
             </p:nvPr>
           </p:nvSpPr>
           <p:spPr>
             <a:xfrm>
-              <a:off x="5461911" y="4320386"/>
+              <a:off x="5339360" y="4320386"/>
               <a:ext cx="630200" cy="203200"/>
             </a:xfrm>
             <a:prstGeom prst="roundRect">
@@ -8235,13 +8225,13 @@
             <p:cNvSpPr txBox="1"/>
             <p:nvPr>
               <p:custDataLst>
-                <p:tags r:id="rId110"/>
+                <p:tags r:id="rId111"/>
               </p:custDataLst>
             </p:nvPr>
           </p:nvSpPr>
           <p:spPr>
             <a:xfrm>
-              <a:off x="5543386" y="4337121"/>
+              <a:off x="5420835" y="4337121"/>
               <a:ext cx="469900" cy="155025"/>
             </a:xfrm>
             <a:prstGeom prst="rect">
@@ -8280,13 +8270,13 @@
             <p:cNvSpPr txBox="1"/>
             <p:nvPr>
               <p:custDataLst>
-                <p:tags r:id="rId111"/>
+                <p:tags r:id="rId112"/>
               </p:custDataLst>
             </p:nvPr>
           </p:nvSpPr>
           <p:spPr>
             <a:xfrm>
-              <a:off x="7467656" y="4115618"/>
+              <a:off x="7345105" y="4115618"/>
               <a:ext cx="1467929" cy="107722"/>
             </a:xfrm>
             <a:prstGeom prst="rect">
@@ -8324,13 +8314,13 @@
             <p:cNvSpPr txBox="1"/>
             <p:nvPr>
               <p:custDataLst>
-                <p:tags r:id="rId112"/>
+                <p:tags r:id="rId113"/>
               </p:custDataLst>
             </p:nvPr>
           </p:nvSpPr>
           <p:spPr>
             <a:xfrm>
-              <a:off x="2560186" y="5397377"/>
+              <a:off x="2437635" y="5397377"/>
               <a:ext cx="744969" cy="184666"/>
             </a:xfrm>
             <a:prstGeom prst="rect">
@@ -8369,13 +8359,13 @@
             <p:cNvSpPr txBox="1"/>
             <p:nvPr>
               <p:custDataLst>
-                <p:tags r:id="rId113"/>
+                <p:tags r:id="rId114"/>
               </p:custDataLst>
             </p:nvPr>
           </p:nvSpPr>
           <p:spPr>
             <a:xfrm>
-              <a:off x="6398318" y="5402310"/>
+              <a:off x="6275767" y="5402310"/>
               <a:ext cx="762000" cy="184666"/>
             </a:xfrm>
             <a:prstGeom prst="rect">
@@ -8414,14 +8404,14 @@
             <p:cNvSpPr txBox="1"/>
             <p:nvPr>
               <p:custDataLst>
-                <p:tags r:id="rId114"/>
+                <p:tags r:id="rId115"/>
               </p:custDataLst>
             </p:nvPr>
           </p:nvSpPr>
           <p:spPr>
             <a:xfrm>
-              <a:off x="6575302" y="5264976"/>
-              <a:ext cx="389006" cy="169277"/>
+              <a:off x="6399755" y="5264976"/>
+              <a:ext cx="463126" cy="169277"/>
             </a:xfrm>
             <a:prstGeom prst="rect">
               <a:avLst/>
@@ -8444,7 +8434,7 @@
                   </a:solidFill>
                   <a:latin typeface="Calibri" panose="020F0502020204030204" pitchFamily="34" charset="0"/>
                 </a:rPr>
-                <a:t>Mar</a:t>
+                <a:t>Mar </a:t>
               </a:r>
               <a:r>
                 <a:rPr lang="en-US" sz="1100" spc="-10" dirty="0" smtClean="0">
@@ -8455,7 +8445,7 @@
                   </a:solidFill>
                   <a:latin typeface="Calibri" panose="020F0502020204030204" pitchFamily="34" charset="0"/>
                 </a:rPr>
-                <a:t> 6</a:t>
+                <a:t>10</a:t>
               </a:r>
               <a:endParaRPr lang="en-US" sz="1100" spc="-10" dirty="0">
                 <a:solidFill>
@@ -8474,13 +8464,13 @@
             <p:cNvSpPr txBox="1"/>
             <p:nvPr>
               <p:custDataLst>
-                <p:tags r:id="rId115"/>
+                <p:tags r:id="rId116"/>
               </p:custDataLst>
             </p:nvPr>
           </p:nvSpPr>
           <p:spPr>
             <a:xfrm>
-              <a:off x="4217951" y="5417450"/>
+              <a:off x="4095400" y="5417450"/>
               <a:ext cx="744969" cy="184666"/>
             </a:xfrm>
             <a:prstGeom prst="rect">
@@ -8519,13 +8509,13 @@
             <p:cNvSpPr txBox="1"/>
             <p:nvPr>
               <p:custDataLst>
-                <p:tags r:id="rId116"/>
+                <p:tags r:id="rId117"/>
               </p:custDataLst>
             </p:nvPr>
           </p:nvSpPr>
           <p:spPr>
             <a:xfrm>
-              <a:off x="778122" y="4673922"/>
+              <a:off x="655571" y="4673922"/>
               <a:ext cx="469900" cy="186055"/>
             </a:xfrm>
             <a:prstGeom prst="rect">
@@ -8563,13 +8553,13 @@
             <p:cNvCxnSpPr/>
             <p:nvPr>
               <p:custDataLst>
-                <p:tags r:id="rId117"/>
+                <p:tags r:id="rId118"/>
               </p:custDataLst>
             </p:nvPr>
           </p:nvCxnSpPr>
           <p:spPr>
             <a:xfrm>
-              <a:off x="1385736" y="4639950"/>
+              <a:off x="1263185" y="4639950"/>
               <a:ext cx="0" cy="254000"/>
             </a:xfrm>
             <a:prstGeom prst="line">
@@ -8608,13 +8598,13 @@
             <p:cNvSpPr txBox="1"/>
             <p:nvPr>
               <p:custDataLst>
-                <p:tags r:id="rId118"/>
+                <p:tags r:id="rId119"/>
               </p:custDataLst>
             </p:nvPr>
           </p:nvSpPr>
           <p:spPr>
             <a:xfrm>
-              <a:off x="1449236" y="4673922"/>
+              <a:off x="1326685" y="4673922"/>
               <a:ext cx="75470" cy="186055"/>
             </a:xfrm>
             <a:prstGeom prst="rect">
@@ -8637,12 +8627,6 @@
                 </a:rPr>
                 <a:t>3</a:t>
               </a:r>
-              <a:endParaRPr lang="en-US" sz="1200" spc="-26" dirty="0">
-                <a:solidFill>
-                  <a:schemeClr val="lt1"/>
-                </a:solidFill>
-                <a:latin typeface="Calibri" panose="020F0502020204030204" pitchFamily="34" charset="0"/>
-              </a:endParaRPr>
             </a:p>
           </p:txBody>
         </p:sp>
@@ -8652,13 +8636,13 @@
             <p:cNvCxnSpPr/>
             <p:nvPr>
               <p:custDataLst>
-                <p:tags r:id="rId119"/>
+                <p:tags r:id="rId120"/>
               </p:custDataLst>
             </p:nvPr>
           </p:nvCxnSpPr>
           <p:spPr>
             <a:xfrm>
-              <a:off x="2056850" y="4639950"/>
+              <a:off x="1934299" y="4639950"/>
               <a:ext cx="0" cy="254000"/>
             </a:xfrm>
             <a:prstGeom prst="line">
@@ -8697,13 +8681,13 @@
             <p:cNvSpPr txBox="1"/>
             <p:nvPr>
               <p:custDataLst>
-                <p:tags r:id="rId120"/>
+                <p:tags r:id="rId121"/>
               </p:custDataLst>
             </p:nvPr>
           </p:nvSpPr>
           <p:spPr>
             <a:xfrm>
-              <a:off x="2120350" y="4673922"/>
+              <a:off x="1997799" y="4673922"/>
               <a:ext cx="150939" cy="186055"/>
             </a:xfrm>
             <a:prstGeom prst="rect">
@@ -8741,13 +8725,13 @@
             <p:cNvCxnSpPr/>
             <p:nvPr>
               <p:custDataLst>
-                <p:tags r:id="rId121"/>
+                <p:tags r:id="rId122"/>
               </p:custDataLst>
             </p:nvPr>
           </p:nvCxnSpPr>
           <p:spPr>
             <a:xfrm>
-              <a:off x="2727964" y="4639950"/>
+              <a:off x="2605413" y="4639950"/>
               <a:ext cx="0" cy="254000"/>
             </a:xfrm>
             <a:prstGeom prst="line">
@@ -8786,13 +8770,13 @@
             <p:cNvSpPr txBox="1"/>
             <p:nvPr>
               <p:custDataLst>
-                <p:tags r:id="rId122"/>
+                <p:tags r:id="rId123"/>
               </p:custDataLst>
             </p:nvPr>
           </p:nvSpPr>
           <p:spPr>
             <a:xfrm>
-              <a:off x="2791465" y="4673922"/>
+              <a:off x="2668914" y="4673922"/>
               <a:ext cx="150939" cy="186055"/>
             </a:xfrm>
             <a:prstGeom prst="rect">
@@ -8830,13 +8814,13 @@
             <p:cNvCxnSpPr/>
             <p:nvPr>
               <p:custDataLst>
-                <p:tags r:id="rId123"/>
+                <p:tags r:id="rId124"/>
               </p:custDataLst>
             </p:nvPr>
           </p:nvCxnSpPr>
           <p:spPr>
             <a:xfrm>
-              <a:off x="3399079" y="4639950"/>
+              <a:off x="3276528" y="4639950"/>
               <a:ext cx="0" cy="254000"/>
             </a:xfrm>
             <a:prstGeom prst="line">
@@ -8875,13 +8859,13 @@
             <p:cNvSpPr txBox="1"/>
             <p:nvPr>
               <p:custDataLst>
-                <p:tags r:id="rId124"/>
+                <p:tags r:id="rId125"/>
               </p:custDataLst>
             </p:nvPr>
           </p:nvSpPr>
           <p:spPr>
             <a:xfrm>
-              <a:off x="3462579" y="4673922"/>
+              <a:off x="3340028" y="4673922"/>
               <a:ext cx="150939" cy="186055"/>
             </a:xfrm>
             <a:prstGeom prst="rect">
@@ -8919,13 +8903,13 @@
             <p:cNvCxnSpPr/>
             <p:nvPr>
               <p:custDataLst>
-                <p:tags r:id="rId125"/>
+                <p:tags r:id="rId126"/>
               </p:custDataLst>
             </p:nvPr>
           </p:nvCxnSpPr>
           <p:spPr>
             <a:xfrm>
-              <a:off x="4070193" y="4639950"/>
+              <a:off x="3947642" y="4639950"/>
               <a:ext cx="0" cy="254000"/>
             </a:xfrm>
             <a:prstGeom prst="line">
@@ -8964,13 +8948,13 @@
             <p:cNvSpPr txBox="1"/>
             <p:nvPr>
               <p:custDataLst>
-                <p:tags r:id="rId126"/>
+                <p:tags r:id="rId127"/>
               </p:custDataLst>
             </p:nvPr>
           </p:nvSpPr>
           <p:spPr>
             <a:xfrm>
-              <a:off x="4133693" y="4673922"/>
+              <a:off x="4011142" y="4673922"/>
               <a:ext cx="150939" cy="186055"/>
             </a:xfrm>
             <a:prstGeom prst="rect">
@@ -9008,13 +8992,13 @@
             <p:cNvCxnSpPr/>
             <p:nvPr>
               <p:custDataLst>
-                <p:tags r:id="rId127"/>
+                <p:tags r:id="rId128"/>
               </p:custDataLst>
             </p:nvPr>
           </p:nvCxnSpPr>
           <p:spPr>
             <a:xfrm>
-              <a:off x="4741307" y="4639950"/>
+              <a:off x="4618756" y="4639950"/>
               <a:ext cx="0" cy="254000"/>
             </a:xfrm>
             <a:prstGeom prst="line">
@@ -9053,13 +9037,13 @@
             <p:cNvSpPr txBox="1"/>
             <p:nvPr>
               <p:custDataLst>
-                <p:tags r:id="rId128"/>
+                <p:tags r:id="rId129"/>
               </p:custDataLst>
             </p:nvPr>
           </p:nvSpPr>
           <p:spPr>
             <a:xfrm>
-              <a:off x="4804807" y="4673922"/>
+              <a:off x="4682256" y="4673922"/>
               <a:ext cx="150939" cy="186055"/>
             </a:xfrm>
             <a:prstGeom prst="rect">
@@ -9097,13 +9081,13 @@
             <p:cNvCxnSpPr/>
             <p:nvPr>
               <p:custDataLst>
-                <p:tags r:id="rId129"/>
+                <p:tags r:id="rId130"/>
               </p:custDataLst>
             </p:nvPr>
           </p:nvCxnSpPr>
           <p:spPr>
             <a:xfrm>
-              <a:off x="5412421" y="4639950"/>
+              <a:off x="5289870" y="4639950"/>
               <a:ext cx="0" cy="254000"/>
             </a:xfrm>
             <a:prstGeom prst="line">
@@ -9142,13 +9126,13 @@
             <p:cNvSpPr txBox="1"/>
             <p:nvPr>
               <p:custDataLst>
-                <p:tags r:id="rId130"/>
+                <p:tags r:id="rId131"/>
               </p:custDataLst>
             </p:nvPr>
           </p:nvSpPr>
           <p:spPr>
             <a:xfrm>
-              <a:off x="5475921" y="4673922"/>
+              <a:off x="5353370" y="4673922"/>
               <a:ext cx="150939" cy="186055"/>
             </a:xfrm>
             <a:prstGeom prst="rect">
@@ -9186,13 +9170,13 @@
             <p:cNvCxnSpPr/>
             <p:nvPr>
               <p:custDataLst>
-                <p:tags r:id="rId131"/>
+                <p:tags r:id="rId132"/>
               </p:custDataLst>
             </p:nvPr>
           </p:nvCxnSpPr>
           <p:spPr>
             <a:xfrm>
-              <a:off x="6083536" y="4639950"/>
+              <a:off x="5960985" y="4639950"/>
               <a:ext cx="0" cy="254000"/>
             </a:xfrm>
             <a:prstGeom prst="line">
@@ -9231,13 +9215,13 @@
             <p:cNvSpPr txBox="1"/>
             <p:nvPr>
               <p:custDataLst>
-                <p:tags r:id="rId132"/>
+                <p:tags r:id="rId133"/>
               </p:custDataLst>
             </p:nvPr>
           </p:nvSpPr>
           <p:spPr>
             <a:xfrm>
-              <a:off x="6147036" y="4673922"/>
+              <a:off x="6024485" y="4673922"/>
               <a:ext cx="150939" cy="186055"/>
             </a:xfrm>
             <a:prstGeom prst="rect">
@@ -9275,13 +9259,13 @@
             <p:cNvCxnSpPr/>
             <p:nvPr>
               <p:custDataLst>
-                <p:tags r:id="rId133"/>
+                <p:tags r:id="rId134"/>
               </p:custDataLst>
             </p:nvPr>
           </p:nvCxnSpPr>
           <p:spPr>
             <a:xfrm>
-              <a:off x="6748210" y="4639950"/>
+              <a:off x="6625659" y="4639950"/>
               <a:ext cx="0" cy="254000"/>
             </a:xfrm>
             <a:prstGeom prst="line">
@@ -9320,13 +9304,13 @@
             <p:cNvSpPr txBox="1"/>
             <p:nvPr>
               <p:custDataLst>
-                <p:tags r:id="rId134"/>
+                <p:tags r:id="rId135"/>
               </p:custDataLst>
             </p:nvPr>
           </p:nvSpPr>
           <p:spPr>
             <a:xfrm>
-              <a:off x="6818150" y="4673922"/>
+              <a:off x="6695599" y="4673922"/>
               <a:ext cx="150939" cy="186055"/>
             </a:xfrm>
             <a:prstGeom prst="rect">
@@ -9364,13 +9348,13 @@
             <p:cNvCxnSpPr/>
             <p:nvPr>
               <p:custDataLst>
-                <p:tags r:id="rId135"/>
+                <p:tags r:id="rId136"/>
               </p:custDataLst>
             </p:nvPr>
           </p:nvCxnSpPr>
           <p:spPr>
             <a:xfrm>
-              <a:off x="7425764" y="4639950"/>
+              <a:off x="7303213" y="4639950"/>
               <a:ext cx="0" cy="254000"/>
             </a:xfrm>
             <a:prstGeom prst="line">
@@ -9409,13 +9393,13 @@
             <p:cNvSpPr txBox="1"/>
             <p:nvPr>
               <p:custDataLst>
-                <p:tags r:id="rId136"/>
+                <p:tags r:id="rId137"/>
               </p:custDataLst>
             </p:nvPr>
           </p:nvSpPr>
           <p:spPr>
             <a:xfrm>
-              <a:off x="7489264" y="4673922"/>
+              <a:off x="7366713" y="4673922"/>
               <a:ext cx="150939" cy="186055"/>
             </a:xfrm>
             <a:prstGeom prst="rect">
@@ -9453,13 +9437,13 @@
             <p:cNvCxnSpPr/>
             <p:nvPr>
               <p:custDataLst>
-                <p:tags r:id="rId137"/>
+                <p:tags r:id="rId138"/>
               </p:custDataLst>
             </p:nvPr>
           </p:nvCxnSpPr>
           <p:spPr>
             <a:xfrm>
-              <a:off x="2915875" y="4979035"/>
+              <a:off x="2793324" y="4979035"/>
               <a:ext cx="0" cy="265458"/>
             </a:xfrm>
             <a:prstGeom prst="line">
@@ -9498,13 +9482,13 @@
             <p:cNvSpPr/>
             <p:nvPr>
               <p:custDataLst>
-                <p:tags r:id="rId138"/>
+                <p:tags r:id="rId139"/>
               </p:custDataLst>
             </p:nvPr>
           </p:nvSpPr>
           <p:spPr>
             <a:xfrm>
-              <a:off x="2839675" y="4886092"/>
+              <a:off x="2717124" y="4886092"/>
               <a:ext cx="152400" cy="177800"/>
             </a:xfrm>
             <a:prstGeom prst="teardrop">
@@ -9565,13 +9549,13 @@
             <p:cNvSpPr/>
             <p:nvPr>
               <p:custDataLst>
-                <p:tags r:id="rId139"/>
+                <p:tags r:id="rId140"/>
               </p:custDataLst>
             </p:nvPr>
           </p:nvSpPr>
           <p:spPr>
             <a:xfrm>
-              <a:off x="6679025" y="4876078"/>
+              <a:off x="6556474" y="4876078"/>
               <a:ext cx="152400" cy="177800"/>
             </a:xfrm>
             <a:prstGeom prst="teardrop">
@@ -9632,13 +9616,13 @@
             <p:cNvSpPr txBox="1"/>
             <p:nvPr>
               <p:custDataLst>
-                <p:tags r:id="rId140"/>
+                <p:tags r:id="rId141"/>
               </p:custDataLst>
             </p:nvPr>
           </p:nvSpPr>
           <p:spPr>
             <a:xfrm>
-              <a:off x="2727964" y="5262304"/>
+              <a:off x="2605413" y="5262304"/>
               <a:ext cx="407713" cy="169277"/>
             </a:xfrm>
             <a:prstGeom prst="rect">
@@ -9677,13 +9661,13 @@
             <p:cNvCxnSpPr/>
             <p:nvPr>
               <p:custDataLst>
-                <p:tags r:id="rId141"/>
+                <p:tags r:id="rId142"/>
               </p:custDataLst>
             </p:nvPr>
           </p:nvCxnSpPr>
           <p:spPr>
             <a:xfrm>
-              <a:off x="4574184" y="4989678"/>
+              <a:off x="4451633" y="4989678"/>
               <a:ext cx="0" cy="265458"/>
             </a:xfrm>
             <a:prstGeom prst="line">
@@ -9720,13 +9704,13 @@
             <p:cNvSpPr/>
             <p:nvPr>
               <p:custDataLst>
-                <p:tags r:id="rId142"/>
+                <p:tags r:id="rId143"/>
               </p:custDataLst>
             </p:nvPr>
           </p:nvSpPr>
           <p:spPr>
             <a:xfrm>
-              <a:off x="4497984" y="4896735"/>
+              <a:off x="4375433" y="4896735"/>
               <a:ext cx="152400" cy="177800"/>
             </a:xfrm>
             <a:prstGeom prst="teardrop">
@@ -9785,13 +9769,13 @@
             <p:cNvSpPr txBox="1"/>
             <p:nvPr>
               <p:custDataLst>
-                <p:tags r:id="rId143"/>
+                <p:tags r:id="rId144"/>
               </p:custDataLst>
             </p:nvPr>
           </p:nvSpPr>
           <p:spPr>
             <a:xfrm>
-              <a:off x="4350265" y="5272947"/>
+              <a:off x="4227714" y="5272947"/>
               <a:ext cx="454542" cy="169277"/>
             </a:xfrm>
             <a:prstGeom prst="rect">
@@ -9830,13 +9814,13 @@
             <p:cNvSpPr txBox="1"/>
             <p:nvPr>
               <p:custDataLst>
-                <p:tags r:id="rId144"/>
+                <p:tags r:id="rId145"/>
               </p:custDataLst>
             </p:nvPr>
           </p:nvSpPr>
           <p:spPr>
             <a:xfrm>
-              <a:off x="4511115" y="4085427"/>
+              <a:off x="4388564" y="4085427"/>
               <a:ext cx="469900" cy="155025"/>
             </a:xfrm>
             <a:prstGeom prst="rect">
@@ -9875,13 +9859,13 @@
             <p:cNvSpPr txBox="1"/>
             <p:nvPr>
               <p:custDataLst>
-                <p:tags r:id="rId145"/>
+                <p:tags r:id="rId146"/>
               </p:custDataLst>
             </p:nvPr>
           </p:nvSpPr>
           <p:spPr>
             <a:xfrm>
-              <a:off x="6991488" y="3451593"/>
+              <a:off x="6771068" y="3291542"/>
               <a:ext cx="368300" cy="155025"/>
             </a:xfrm>
             <a:prstGeom prst="rect">
@@ -9920,13 +9904,13 @@
             <p:cNvCxnSpPr/>
             <p:nvPr>
               <p:custDataLst>
-                <p:tags r:id="rId146"/>
+                <p:tags r:id="rId147"/>
               </p:custDataLst>
             </p:nvPr>
           </p:nvCxnSpPr>
           <p:spPr>
             <a:xfrm>
-              <a:off x="6760001" y="5013375"/>
+              <a:off x="6637450" y="5013375"/>
               <a:ext cx="0" cy="265458"/>
             </a:xfrm>
             <a:prstGeom prst="line">
@@ -9965,14 +9949,14 @@
             <p:cNvSpPr txBox="1"/>
             <p:nvPr>
               <p:custDataLst>
-                <p:tags r:id="rId147"/>
+                <p:tags r:id="rId148"/>
               </p:custDataLst>
             </p:nvPr>
           </p:nvSpPr>
           <p:spPr>
             <a:xfrm>
-              <a:off x="7640293" y="3375185"/>
-              <a:ext cx="1237465" cy="446276"/>
+              <a:off x="7340757" y="3185917"/>
+              <a:ext cx="1237465" cy="353943"/>
             </a:xfrm>
             <a:prstGeom prst="rect">
               <a:avLst/>
@@ -10007,14 +9991,6 @@
                 </a:rPr>
                 <a:t> &amp; Validation</a:t>
               </a:r>
-              <a:endParaRPr lang="en-US" sz="1100" b="1" spc="-6" dirty="0" smtClean="0">
-                <a:solidFill>
-                  <a:schemeClr val="accent3">
-                    <a:lumMod val="75000"/>
-                  </a:schemeClr>
-                </a:solidFill>
-                <a:latin typeface="Calibri" panose="020F0502020204030204" pitchFamily="34" charset="0"/>
-              </a:endParaRPr>
             </a:p>
             <a:p>
               <a:pPr marL="171450" indent="-171450">
@@ -10069,58 +10045,24 @@
                   </a:solidFill>
                   <a:latin typeface="Calibri" panose="020F0502020204030204" pitchFamily="34" charset="0"/>
                 </a:rPr>
-                <a:t>Code development for validation (if needed)</a:t>
+                <a:t>Code development for </a:t>
+              </a:r>
+              <a:r>
+                <a:rPr lang="en-US" sz="600" b="1" spc="-6" dirty="0" smtClean="0">
+                  <a:solidFill>
+                    <a:schemeClr val="accent3">
+                      <a:lumMod val="75000"/>
+                    </a:schemeClr>
+                  </a:solidFill>
+                  <a:latin typeface="Calibri" panose="020F0502020204030204" pitchFamily="34" charset="0"/>
+                </a:rPr>
+                <a:t>validation</a:t>
               </a:r>
               <a:endParaRPr lang="en-US" sz="600" b="1" spc="-6" dirty="0">
                 <a:solidFill>
                   <a:schemeClr val="accent3">
                     <a:lumMod val="75000"/>
                   </a:schemeClr>
-                </a:solidFill>
-                <a:latin typeface="Calibri" panose="020F0502020204030204" pitchFamily="34" charset="0"/>
-              </a:endParaRPr>
-            </a:p>
-          </p:txBody>
-        </p:sp>
-        <p:sp>
-          <p:nvSpPr>
-            <p:cNvPr id="230" name="OTLSHAPE_T_483bbbf5c83f40fdba3b1ddb997e80eb_Duration"/>
-            <p:cNvSpPr txBox="1"/>
-            <p:nvPr>
-              <p:custDataLst>
-                <p:tags r:id="rId148"/>
-              </p:custDataLst>
-            </p:nvPr>
-          </p:nvSpPr>
-          <p:spPr>
-            <a:xfrm>
-              <a:off x="6306678" y="3044548"/>
-              <a:ext cx="424188" cy="153888"/>
-            </a:xfrm>
-            <a:prstGeom prst="rect">
-              <a:avLst/>
-            </a:prstGeom>
-            <a:noFill/>
-          </p:spPr>
-          <p:txBody>
-            <a:bodyPr vert="horz" wrap="square" lIns="0" tIns="0" rIns="0" bIns="0" rtlCol="0" anchor="ctr" anchorCtr="0">
-              <a:spAutoFit/>
-            </a:bodyPr>
-            <a:lstStyle/>
-            <a:p>
-              <a:pPr algn="ctr"/>
-              <a:r>
-                <a:rPr lang="en-US" sz="1000" b="1" spc="-8" dirty="0" smtClean="0">
-                  <a:solidFill>
-                    <a:schemeClr val="lt1"/>
-                  </a:solidFill>
-                  <a:latin typeface="Calibri" panose="020F0502020204030204" pitchFamily="34" charset="0"/>
-                </a:rPr>
-                <a:t>2 days</a:t>
-              </a:r>
-              <a:endParaRPr lang="en-US" sz="1000" b="1" spc="-8" dirty="0">
-                <a:solidFill>
-                  <a:schemeClr val="lt1"/>
                 </a:solidFill>
                 <a:latin typeface="Calibri" panose="020F0502020204030204" pitchFamily="34" charset="0"/>
               </a:endParaRPr>
@@ -10139,7 +10081,7 @@
           </p:nvSpPr>
           <p:spPr>
             <a:xfrm>
-              <a:off x="6292292" y="3242206"/>
+              <a:off x="5691463" y="3044895"/>
               <a:ext cx="468869" cy="153888"/>
             </a:xfrm>
             <a:prstGeom prst="rect">
@@ -10153,7 +10095,7 @@
             </a:bodyPr>
             <a:lstStyle/>
             <a:p>
-              <a:pPr algn="ctr"/>
+              <a:pPr algn="r"/>
               <a:r>
                 <a:rPr lang="en-US" sz="500" b="1" spc="-6" dirty="0" smtClean="0">
                   <a:solidFill>
@@ -10165,7 +10107,7 @@
               </a:r>
             </a:p>
             <a:p>
-              <a:pPr algn="ctr"/>
+              <a:pPr algn="r"/>
               <a:r>
                 <a:rPr lang="en-US" sz="500" b="1" spc="-6" dirty="0" smtClean="0">
                   <a:solidFill>
@@ -10190,7 +10132,7 @@
           </p:nvSpPr>
           <p:spPr>
             <a:xfrm>
-              <a:off x="6083536" y="3819176"/>
+              <a:off x="5960985" y="3819176"/>
               <a:ext cx="1499320" cy="203200"/>
             </a:xfrm>
             <a:prstGeom prst="roundRect">
@@ -10281,7 +10223,7 @@
           </p:nvSpPr>
           <p:spPr>
             <a:xfrm>
-              <a:off x="6596475" y="3837590"/>
+              <a:off x="6473924" y="3837590"/>
               <a:ext cx="469900" cy="155025"/>
             </a:xfrm>
             <a:prstGeom prst="rect">
@@ -10326,7 +10268,7 @@
           </p:nvSpPr>
           <p:spPr>
             <a:xfrm>
-              <a:off x="5205989" y="3801369"/>
+              <a:off x="5083438" y="3801369"/>
               <a:ext cx="839783" cy="215444"/>
             </a:xfrm>
             <a:prstGeom prst="rect">
@@ -10389,8 +10331,8 @@
           </p:nvSpPr>
           <p:spPr>
             <a:xfrm>
-              <a:off x="7588067" y="4318348"/>
-              <a:ext cx="448585" cy="203200"/>
+              <a:off x="6623870" y="4324514"/>
+              <a:ext cx="670513" cy="203200"/>
             </a:xfrm>
             <a:prstGeom prst="roundRect">
               <a:avLst>
@@ -10480,7 +10422,7 @@
           </p:nvSpPr>
           <p:spPr>
             <a:xfrm>
-              <a:off x="7563611" y="4325328"/>
+              <a:off x="6707261" y="4344473"/>
               <a:ext cx="469900" cy="155025"/>
             </a:xfrm>
             <a:prstGeom prst="rect">
@@ -10502,7 +10444,25 @@
                   </a:solidFill>
                   <a:latin typeface="Calibri" panose="020F0502020204030204" pitchFamily="34" charset="0"/>
                 </a:rPr>
-                <a:t> 2 days</a:t>
+                <a:t> </a:t>
+              </a:r>
+              <a:r>
+                <a:rPr lang="en-US" sz="1000" b="1" spc="-6" dirty="0" smtClean="0">
+                  <a:solidFill>
+                    <a:schemeClr val="lt1"/>
+                  </a:solidFill>
+                  <a:latin typeface="Calibri" panose="020F0502020204030204" pitchFamily="34" charset="0"/>
+                </a:rPr>
+                <a:t>3 </a:t>
+              </a:r>
+              <a:r>
+                <a:rPr lang="en-US" sz="1000" b="1" spc="-6" dirty="0" smtClean="0">
+                  <a:solidFill>
+                    <a:schemeClr val="lt1"/>
+                  </a:solidFill>
+                  <a:latin typeface="Calibri" panose="020F0502020204030204" pitchFamily="34" charset="0"/>
+                </a:rPr>
+                <a:t>days</a:t>
               </a:r>
               <a:endParaRPr lang="en-US" sz="1000" b="1" spc="-6" dirty="0">
                 <a:solidFill>
@@ -10525,7 +10485,7 @@
           </p:nvSpPr>
           <p:spPr>
             <a:xfrm>
-              <a:off x="8075851" y="4372298"/>
+              <a:off x="7313325" y="4372252"/>
               <a:ext cx="534804" cy="107723"/>
             </a:xfrm>
             <a:prstGeom prst="rect">
@@ -10569,7 +10529,7 @@
           </p:nvSpPr>
           <p:spPr>
             <a:xfrm>
-              <a:off x="7236072" y="5404333"/>
+              <a:off x="6948813" y="5671263"/>
               <a:ext cx="762000" cy="184666"/>
             </a:xfrm>
             <a:prstGeom prst="rect">
@@ -10614,7 +10574,7 @@
           </p:nvSpPr>
           <p:spPr>
             <a:xfrm>
-              <a:off x="7371632" y="5273001"/>
+              <a:off x="7084373" y="5539931"/>
               <a:ext cx="448071" cy="169277"/>
             </a:xfrm>
             <a:prstGeom prst="rect">
@@ -10638,7 +10598,7 @@
                   </a:solidFill>
                   <a:latin typeface="Calibri" panose="020F0502020204030204" pitchFamily="34" charset="0"/>
                 </a:rPr>
-                <a:t>Mar</a:t>
+                <a:t>Mar </a:t>
               </a:r>
               <a:r>
                 <a:rPr lang="en-US" sz="1100" spc="-10" dirty="0" smtClean="0">
@@ -10649,7 +10609,7 @@
                   </a:solidFill>
                   <a:latin typeface="Calibri" panose="020F0502020204030204" pitchFamily="34" charset="0"/>
                 </a:rPr>
-                <a:t> 10</a:t>
+                <a:t>13</a:t>
               </a:r>
               <a:endParaRPr lang="en-US" sz="1100" spc="-10" dirty="0">
                 <a:solidFill>
@@ -10674,7 +10634,7 @@
           </p:nvSpPr>
           <p:spPr>
             <a:xfrm>
-              <a:off x="7516779" y="4878101"/>
+              <a:off x="7229520" y="4878101"/>
               <a:ext cx="152400" cy="177800"/>
             </a:xfrm>
             <a:prstGeom prst="teardrop">
@@ -10732,7 +10692,9 @@
         <p:cxnSp>
           <p:nvCxnSpPr>
             <p:cNvPr id="259" name="OTLSHAPE_M_c6c892620afd42aba44c1b51ae7d3a52_Connector1"/>
-            <p:cNvCxnSpPr/>
+            <p:cNvCxnSpPr>
+              <a:endCxn id="257" idx="0"/>
+            </p:cNvCxnSpPr>
             <p:nvPr>
               <p:custDataLst>
                 <p:tags r:id="rId159"/>
@@ -10740,9 +10702,9 @@
             </p:nvPr>
           </p:nvCxnSpPr>
           <p:spPr>
-            <a:xfrm>
-              <a:off x="7597755" y="5015398"/>
-              <a:ext cx="0" cy="265458"/>
+            <a:xfrm flipH="1">
+              <a:off x="7308409" y="5015398"/>
+              <a:ext cx="2087" cy="524533"/>
             </a:xfrm>
             <a:prstGeom prst="line">
               <a:avLst/>
@@ -10786,7 +10748,7 @@
           </p:nvSpPr>
           <p:spPr>
             <a:xfrm>
-              <a:off x="7836119" y="5766923"/>
+              <a:off x="7703642" y="5866118"/>
               <a:ext cx="762000" cy="184666"/>
             </a:xfrm>
             <a:prstGeom prst="rect">
@@ -10831,7 +10793,7 @@
           </p:nvSpPr>
           <p:spPr>
             <a:xfrm>
-              <a:off x="7971679" y="5626795"/>
+              <a:off x="7839202" y="5725990"/>
               <a:ext cx="448071" cy="169277"/>
             </a:xfrm>
             <a:prstGeom prst="rect">
@@ -10853,16 +10815,7 @@
                   </a:solidFill>
                   <a:latin typeface="Calibri" panose="020F0502020204030204" pitchFamily="34" charset="0"/>
                 </a:rPr>
-                <a:t>Mar</a:t>
-              </a:r>
-              <a:r>
-                <a:rPr lang="en-US" sz="1100" spc="-10" dirty="0" smtClean="0">
-                  <a:solidFill>
-                    <a:srgbClr val="7030A0"/>
-                  </a:solidFill>
-                  <a:latin typeface="Calibri" panose="020F0502020204030204" pitchFamily="34" charset="0"/>
-                </a:rPr>
-                <a:t> 15</a:t>
+                <a:t>Mar 15</a:t>
               </a:r>
               <a:endParaRPr lang="en-US" sz="1100" spc="-10" dirty="0">
                 <a:solidFill>
@@ -10885,7 +10838,7 @@
           </p:nvSpPr>
           <p:spPr>
             <a:xfrm>
-              <a:off x="8116826" y="4880206"/>
+              <a:off x="7994275" y="4880206"/>
               <a:ext cx="152400" cy="177800"/>
             </a:xfrm>
             <a:prstGeom prst="teardrop">
@@ -10944,6 +10897,7 @@
           <p:nvCxnSpPr>
             <p:cNvPr id="263" name="OTLSHAPE_M_c6c892620afd42aba44c1b51ae7d3a52_Connector1"/>
             <p:cNvCxnSpPr>
+              <a:stCxn id="262" idx="2"/>
               <a:endCxn id="261" idx="0"/>
             </p:cNvCxnSpPr>
             <p:nvPr>
@@ -10954,8 +10908,8 @@
           </p:nvCxnSpPr>
           <p:spPr>
             <a:xfrm flipH="1">
-              <a:off x="8195715" y="5017503"/>
-              <a:ext cx="2087" cy="609292"/>
+              <a:off x="8063238" y="5058006"/>
+              <a:ext cx="7237" cy="667984"/>
             </a:xfrm>
             <a:prstGeom prst="line">
               <a:avLst/>
@@ -10997,7 +10951,7 @@
           </p:nvSpPr>
           <p:spPr>
             <a:xfrm>
-              <a:off x="259052" y="5746694"/>
+              <a:off x="136501" y="5869244"/>
               <a:ext cx="762000" cy="184666"/>
             </a:xfrm>
             <a:prstGeom prst="rect">
@@ -11042,7 +10996,7 @@
           </p:nvSpPr>
           <p:spPr>
             <a:xfrm>
-              <a:off x="394612" y="5606566"/>
+              <a:off x="272061" y="5729116"/>
               <a:ext cx="448071" cy="169277"/>
             </a:xfrm>
             <a:prstGeom prst="rect">
@@ -11087,7 +11041,7 @@
           </p:nvSpPr>
           <p:spPr>
             <a:xfrm>
-              <a:off x="539759" y="4859977"/>
+              <a:off x="417208" y="4859977"/>
               <a:ext cx="152400" cy="177800"/>
             </a:xfrm>
             <a:prstGeom prst="teardrop">
@@ -11145,7 +11099,9 @@
         <p:cxnSp>
           <p:nvCxnSpPr>
             <p:cNvPr id="268" name="OTLSHAPE_M_c6c892620afd42aba44c1b51ae7d3a52_Connector1"/>
-            <p:cNvCxnSpPr/>
+            <p:cNvCxnSpPr>
+              <a:endCxn id="266" idx="0"/>
+            </p:cNvCxnSpPr>
             <p:nvPr>
               <p:custDataLst>
                 <p:tags r:id="rId167"/>
@@ -11154,8 +11110,8 @@
           </p:nvCxnSpPr>
           <p:spPr>
             <a:xfrm flipH="1">
-              <a:off x="618648" y="4997274"/>
-              <a:ext cx="2087" cy="609292"/>
+              <a:off x="496097" y="4997274"/>
+              <a:ext cx="2088" cy="731842"/>
             </a:xfrm>
             <a:prstGeom prst="line">
               <a:avLst/>
@@ -11185,6 +11141,565 @@
             </a:fontRef>
           </p:style>
         </p:cxnSp>
+        <p:cxnSp>
+          <p:nvCxnSpPr>
+            <p:cNvPr id="173" name="OTLSHAPE_T_5417459faabd473e8e317c8fe7fed1ca_RightVerticalConnector1"/>
+            <p:cNvCxnSpPr/>
+            <p:nvPr>
+              <p:custDataLst>
+                <p:tags r:id="rId168"/>
+              </p:custDataLst>
+            </p:nvPr>
+          </p:nvCxnSpPr>
+          <p:spPr>
+            <a:xfrm>
+              <a:off x="6180370" y="3135315"/>
+              <a:ext cx="0" cy="2491480"/>
+            </a:xfrm>
+            <a:prstGeom prst="line">
+              <a:avLst/>
+            </a:prstGeom>
+            <a:ln w="9525" cap="flat" cmpd="sng" algn="ctr">
+              <a:solidFill>
+                <a:schemeClr val="accent4">
+                  <a:lumMod val="60000"/>
+                  <a:lumOff val="40000"/>
+                </a:schemeClr>
+              </a:solidFill>
+              <a:prstDash val="sysDash"/>
+              <a:miter lim="800000"/>
+              <a:headEnd type="none" w="med" len="med"/>
+              <a:tailEnd type="none" w="med" len="med"/>
+            </a:ln>
+          </p:spPr>
+          <p:style>
+            <a:lnRef idx="1">
+              <a:schemeClr val="accent1"/>
+            </a:lnRef>
+            <a:fillRef idx="0">
+              <a:schemeClr val="accent1"/>
+            </a:fillRef>
+            <a:effectRef idx="0">
+              <a:schemeClr val="accent1"/>
+            </a:effectRef>
+            <a:fontRef idx="minor">
+              <a:schemeClr val="tx1"/>
+            </a:fontRef>
+          </p:style>
+        </p:cxnSp>
+        <p:sp>
+          <p:nvSpPr>
+            <p:cNvPr id="174" name="OTLSHAPE_M_5a8668fe0e5f47688340e8a167c5bf9b_Date"/>
+            <p:cNvSpPr txBox="1"/>
+            <p:nvPr>
+              <p:custDataLst>
+                <p:tags r:id="rId169"/>
+              </p:custDataLst>
+            </p:nvPr>
+          </p:nvSpPr>
+          <p:spPr>
+            <a:xfrm>
+              <a:off x="5941049" y="5611185"/>
+              <a:ext cx="463126" cy="169277"/>
+            </a:xfrm>
+            <a:prstGeom prst="rect">
+              <a:avLst/>
+            </a:prstGeom>
+            <a:noFill/>
+          </p:spPr>
+          <p:txBody>
+            <a:bodyPr vert="horz" wrap="square" lIns="0" tIns="0" rIns="0" bIns="0" rtlCol="0" anchor="ctr" anchorCtr="0">
+              <a:spAutoFit/>
+            </a:bodyPr>
+            <a:lstStyle/>
+            <a:p>
+              <a:pPr algn="ctr"/>
+              <a:r>
+                <a:rPr lang="en-US" sz="1100" spc="-10" dirty="0" smtClean="0">
+                  <a:solidFill>
+                    <a:schemeClr val="accent4">
+                      <a:lumMod val="60000"/>
+                      <a:lumOff val="40000"/>
+                    </a:schemeClr>
+                  </a:solidFill>
+                  <a:latin typeface="Calibri" panose="020F0502020204030204" pitchFamily="34" charset="0"/>
+                </a:rPr>
+                <a:t>Mar </a:t>
+              </a:r>
+              <a:r>
+                <a:rPr lang="en-US" sz="1100" spc="-10" dirty="0">
+                  <a:solidFill>
+                    <a:schemeClr val="accent4">
+                      <a:lumMod val="60000"/>
+                      <a:lumOff val="40000"/>
+                    </a:schemeClr>
+                  </a:solidFill>
+                  <a:latin typeface="Calibri" panose="020F0502020204030204" pitchFamily="34" charset="0"/>
+                </a:rPr>
+                <a:t>8</a:t>
+              </a:r>
+              <a:endParaRPr lang="en-US" sz="1100" spc="-10" dirty="0">
+                <a:solidFill>
+                  <a:schemeClr val="accent4">
+                    <a:lumMod val="60000"/>
+                    <a:lumOff val="40000"/>
+                  </a:schemeClr>
+                </a:solidFill>
+                <a:latin typeface="Calibri" panose="020F0502020204030204" pitchFamily="34" charset="0"/>
+              </a:endParaRPr>
+            </a:p>
+          </p:txBody>
+        </p:sp>
+        <p:sp>
+          <p:nvSpPr>
+            <p:cNvPr id="229" name="OTLSHAPE_T_483bbbf5c83f40fdba3b1ddb997e80eb_Shape"/>
+            <p:cNvSpPr/>
+            <p:nvPr>
+              <p:custDataLst>
+                <p:tags r:id="rId170"/>
+              </p:custDataLst>
+            </p:nvPr>
+          </p:nvSpPr>
+          <p:spPr>
+            <a:xfrm>
+              <a:off x="6175424" y="3022235"/>
+              <a:ext cx="458148" cy="205806"/>
+            </a:xfrm>
+            <a:prstGeom prst="roundRect">
+              <a:avLst>
+                <a:gd name="adj" fmla="val 100000"/>
+              </a:avLst>
+            </a:prstGeom>
+            <a:solidFill>
+              <a:srgbClr val="1C5B81"/>
+            </a:solidFill>
+            <a:ln w="12700" cap="flat" cmpd="sng" algn="ctr">
+              <a:noFill/>
+              <a:prstDash val="solid"/>
+              <a:miter lim="800000"/>
+            </a:ln>
+            <a:effectLst/>
+            <a:scene3d>
+              <a:camera prst="orthographicFront"/>
+              <a:lightRig rig="balanced" dir="t">
+                <a:rot lat="0" lon="0" rev="8700000"/>
+              </a:lightRig>
+            </a:scene3d>
+            <a:sp3d>
+              <a:bevelT w="165100" h="12700"/>
+            </a:sp3d>
+            <a:extLst>
+              <a:ext uri="{91240B29-F687-4F45-9708-019B960494DF}">
+                <a14:hiddenLine xmlns:a14="http://schemas.microsoft.com/office/drawing/2010/main" w="12700" cap="flat" cmpd="sng" algn="ctr">
+                  <a:solidFill>
+                    <a:schemeClr val="accent1">
+                      <a:shade val="50000"/>
+                    </a:schemeClr>
+                  </a:solidFill>
+                  <a:prstDash val="solid"/>
+                  <a:miter lim="800000"/>
+                </a14:hiddenLine>
+              </a:ext>
+              <a:ext uri="{AF507438-7753-43E0-B8FC-AC1667EBCBE1}">
+                <a14:hiddenEffects xmlns:a14="http://schemas.microsoft.com/office/drawing/2010/main">
+                  <a:effectLst>
+                    <a:outerShdw>
+                      <a:scrgbClr r="0" g="0" b="0">
+                        <a:alpha val="50000"/>
+                      </a:scrgbClr>
+                    </a:outerShdw>
+                  </a:effectLst>
+                </a14:hiddenEffects>
+              </a:ext>
+              <a:ext uri="{53640926-AAD7-44D8-BBD7-CCE9431645EC}">
+                <a14:shadowObscured xmlns:a14="http://schemas.microsoft.com/office/drawing/2010/main" val="1"/>
+              </a:ext>
+            </a:extLst>
+          </p:spPr>
+          <p:style>
+            <a:lnRef idx="2">
+              <a:schemeClr val="accent1">
+                <a:shade val="50000"/>
+              </a:schemeClr>
+            </a:lnRef>
+            <a:fillRef idx="1">
+              <a:schemeClr val="accent1"/>
+            </a:fillRef>
+            <a:effectRef idx="0">
+              <a:schemeClr val="accent1"/>
+            </a:effectRef>
+            <a:fontRef idx="minor">
+              <a:schemeClr val="lt1"/>
+            </a:fontRef>
+          </p:style>
+          <p:txBody>
+            <a:bodyPr rtlCol="0" anchor="ctr"/>
+            <a:lstStyle/>
+            <a:p>
+              <a:pPr algn="ctr"/>
+              <a:endParaRPr lang="en-US"/>
+            </a:p>
+          </p:txBody>
+        </p:sp>
+        <p:sp>
+          <p:nvSpPr>
+            <p:cNvPr id="230" name="OTLSHAPE_T_483bbbf5c83f40fdba3b1ddb997e80eb_Duration"/>
+            <p:cNvSpPr txBox="1"/>
+            <p:nvPr>
+              <p:custDataLst>
+                <p:tags r:id="rId171"/>
+              </p:custDataLst>
+            </p:nvPr>
+          </p:nvSpPr>
+          <p:spPr>
+            <a:xfrm>
+              <a:off x="6181651" y="3037565"/>
+              <a:ext cx="424188" cy="153888"/>
+            </a:xfrm>
+            <a:prstGeom prst="rect">
+              <a:avLst/>
+            </a:prstGeom>
+            <a:noFill/>
+          </p:spPr>
+          <p:txBody>
+            <a:bodyPr vert="horz" wrap="square" lIns="0" tIns="0" rIns="0" bIns="0" rtlCol="0" anchor="ctr" anchorCtr="0">
+              <a:spAutoFit/>
+            </a:bodyPr>
+            <a:lstStyle/>
+            <a:p>
+              <a:pPr algn="ctr"/>
+              <a:r>
+                <a:rPr lang="en-US" sz="1000" b="1" spc="-8" dirty="0" smtClean="0">
+                  <a:solidFill>
+                    <a:schemeClr val="lt1"/>
+                  </a:solidFill>
+                  <a:latin typeface="Calibri" panose="020F0502020204030204" pitchFamily="34" charset="0"/>
+                </a:rPr>
+                <a:t>2 days</a:t>
+              </a:r>
+              <a:endParaRPr lang="en-US" sz="1000" b="1" spc="-8" dirty="0">
+                <a:solidFill>
+                  <a:schemeClr val="lt1"/>
+                </a:solidFill>
+                <a:latin typeface="Calibri" panose="020F0502020204030204" pitchFamily="34" charset="0"/>
+              </a:endParaRPr>
+            </a:p>
+          </p:txBody>
+        </p:sp>
+        <p:sp>
+          <p:nvSpPr>
+            <p:cNvPr id="181" name="OTLSHAPE_T_5417459faabd473e8e317c8fe7fed1ca_Shape"/>
+            <p:cNvSpPr/>
+            <p:nvPr>
+              <p:custDataLst>
+                <p:tags r:id="rId172"/>
+              </p:custDataLst>
+            </p:nvPr>
+          </p:nvSpPr>
+          <p:spPr>
+            <a:xfrm>
+              <a:off x="5726603" y="3563934"/>
+              <a:ext cx="905495" cy="212814"/>
+            </a:xfrm>
+            <a:prstGeom prst="roundRect">
+              <a:avLst>
+                <a:gd name="adj" fmla="val 100000"/>
+              </a:avLst>
+            </a:prstGeom>
+            <a:solidFill>
+              <a:schemeClr val="accent3">
+                <a:lumMod val="75000"/>
+              </a:schemeClr>
+            </a:solidFill>
+            <a:ln w="12700" cap="flat" cmpd="sng" algn="ctr">
+              <a:noFill/>
+              <a:prstDash val="solid"/>
+              <a:miter lim="800000"/>
+            </a:ln>
+            <a:effectLst/>
+            <a:scene3d>
+              <a:camera prst="orthographicFront"/>
+              <a:lightRig rig="balanced" dir="t">
+                <a:rot lat="0" lon="0" rev="8700000"/>
+              </a:lightRig>
+            </a:scene3d>
+            <a:sp3d>
+              <a:bevelT w="165100" h="12700"/>
+            </a:sp3d>
+            <a:extLst>
+              <a:ext uri="{53640926-AAD7-44D8-BBD7-CCE9431645EC}">
+                <a14:shadowObscured xmlns:a14="http://schemas.microsoft.com/office/drawing/2010/main" val="1"/>
+              </a:ext>
+            </a:extLst>
+          </p:spPr>
+          <p:style>
+            <a:lnRef idx="2">
+              <a:schemeClr val="accent1">
+                <a:shade val="50000"/>
+              </a:schemeClr>
+            </a:lnRef>
+            <a:fillRef idx="1">
+              <a:schemeClr val="accent1"/>
+            </a:fillRef>
+            <a:effectRef idx="0">
+              <a:schemeClr val="accent1"/>
+            </a:effectRef>
+            <a:fontRef idx="minor">
+              <a:schemeClr val="lt1"/>
+            </a:fontRef>
+          </p:style>
+          <p:txBody>
+            <a:bodyPr rtlCol="0" anchor="ctr"/>
+            <a:lstStyle/>
+            <a:p>
+              <a:pPr algn="ctr"/>
+              <a:endParaRPr lang="en-US"/>
+            </a:p>
+          </p:txBody>
+        </p:sp>
+        <p:sp>
+          <p:nvSpPr>
+            <p:cNvPr id="184" name="OTLSHAPE_T_483bbbf5c83f40fdba3b1ddb997e80eb_Duration"/>
+            <p:cNvSpPr txBox="1"/>
+            <p:nvPr>
+              <p:custDataLst>
+                <p:tags r:id="rId173"/>
+              </p:custDataLst>
+            </p:nvPr>
+          </p:nvSpPr>
+          <p:spPr>
+            <a:xfrm>
+              <a:off x="5995200" y="3580830"/>
+              <a:ext cx="368300" cy="155025"/>
+            </a:xfrm>
+            <a:prstGeom prst="rect">
+              <a:avLst/>
+            </a:prstGeom>
+            <a:noFill/>
+          </p:spPr>
+          <p:txBody>
+            <a:bodyPr vert="horz" wrap="square" lIns="0" tIns="0" rIns="0" bIns="0" rtlCol="0" anchor="ctr" anchorCtr="0">
+              <a:spAutoFit/>
+            </a:bodyPr>
+            <a:lstStyle/>
+            <a:p>
+              <a:pPr algn="ctr"/>
+              <a:r>
+                <a:rPr lang="en-US" sz="1000" b="1" spc="-8" dirty="0">
+                  <a:solidFill>
+                    <a:schemeClr val="lt1"/>
+                  </a:solidFill>
+                  <a:latin typeface="Calibri" panose="020F0502020204030204" pitchFamily="34" charset="0"/>
+                </a:rPr>
+                <a:t>4</a:t>
+              </a:r>
+              <a:r>
+                <a:rPr lang="en-US" sz="1000" b="1" spc="-8" dirty="0" smtClean="0">
+                  <a:solidFill>
+                    <a:schemeClr val="lt1"/>
+                  </a:solidFill>
+                  <a:latin typeface="Calibri" panose="020F0502020204030204" pitchFamily="34" charset="0"/>
+                </a:rPr>
+                <a:t> </a:t>
+              </a:r>
+              <a:r>
+                <a:rPr lang="en-US" sz="1000" b="1" spc="-8" dirty="0" smtClean="0">
+                  <a:solidFill>
+                    <a:schemeClr val="lt1"/>
+                  </a:solidFill>
+                  <a:latin typeface="Calibri" panose="020F0502020204030204" pitchFamily="34" charset="0"/>
+                </a:rPr>
+                <a:t>days</a:t>
+              </a:r>
+              <a:endParaRPr lang="en-US" sz="1000" b="1" spc="-8" dirty="0">
+                <a:solidFill>
+                  <a:schemeClr val="lt1"/>
+                </a:solidFill>
+                <a:latin typeface="Calibri" panose="020F0502020204030204" pitchFamily="34" charset="0"/>
+              </a:endParaRPr>
+            </a:p>
+          </p:txBody>
+        </p:sp>
+        <p:sp>
+          <p:nvSpPr>
+            <p:cNvPr id="185" name="OTLSHAPE_T_81e5f26d871f4ae5ae3409ab7e19e699_Title"/>
+            <p:cNvSpPr txBox="1"/>
+            <p:nvPr>
+              <p:custDataLst>
+                <p:tags r:id="rId174"/>
+              </p:custDataLst>
+            </p:nvPr>
+          </p:nvSpPr>
+          <p:spPr>
+            <a:xfrm>
+              <a:off x="6671911" y="3581232"/>
+              <a:ext cx="1237465" cy="169277"/>
+            </a:xfrm>
+            <a:prstGeom prst="rect">
+              <a:avLst/>
+            </a:prstGeom>
+            <a:noFill/>
+          </p:spPr>
+          <p:txBody>
+            <a:bodyPr vert="horz" wrap="square" lIns="0" tIns="0" rIns="0" bIns="0" rtlCol="0" anchor="ctr" anchorCtr="0">
+              <a:spAutoFit/>
+            </a:bodyPr>
+            <a:lstStyle/>
+            <a:p>
+              <a:r>
+                <a:rPr lang="en-US" sz="1100" b="1" spc="-6" dirty="0" smtClean="0">
+                  <a:solidFill>
+                    <a:schemeClr val="accent3">
+                      <a:lumMod val="75000"/>
+                    </a:schemeClr>
+                  </a:solidFill>
+                  <a:latin typeface="Calibri" panose="020F0502020204030204" pitchFamily="34" charset="0"/>
+                </a:rPr>
+                <a:t>GUI Development</a:t>
+              </a:r>
+              <a:endParaRPr lang="en-US" sz="1100" b="1" spc="-6" dirty="0" smtClean="0">
+                <a:solidFill>
+                  <a:schemeClr val="accent3">
+                    <a:lumMod val="75000"/>
+                  </a:schemeClr>
+                </a:solidFill>
+                <a:latin typeface="Calibri" panose="020F0502020204030204" pitchFamily="34" charset="0"/>
+              </a:endParaRPr>
+            </a:p>
+          </p:txBody>
+        </p:sp>
+        <p:sp>
+          <p:nvSpPr>
+            <p:cNvPr id="23" name="5-Point Star 22"/>
+            <p:cNvSpPr/>
+            <p:nvPr/>
+          </p:nvSpPr>
+          <p:spPr>
+            <a:xfrm>
+              <a:off x="8156102" y="4635513"/>
+              <a:ext cx="244512" cy="246521"/>
+            </a:xfrm>
+            <a:prstGeom prst="star5">
+              <a:avLst/>
+            </a:prstGeom>
+            <a:solidFill>
+              <a:srgbClr val="FFFF00"/>
+            </a:solidFill>
+            <a:ln>
+              <a:solidFill>
+                <a:schemeClr val="tx1"/>
+              </a:solidFill>
+            </a:ln>
+          </p:spPr>
+          <p:style>
+            <a:lnRef idx="2">
+              <a:schemeClr val="accent1">
+                <a:shade val="50000"/>
+              </a:schemeClr>
+            </a:lnRef>
+            <a:fillRef idx="1">
+              <a:schemeClr val="accent1"/>
+            </a:fillRef>
+            <a:effectRef idx="0">
+              <a:schemeClr val="accent1"/>
+            </a:effectRef>
+            <a:fontRef idx="minor">
+              <a:schemeClr val="lt1"/>
+            </a:fontRef>
+          </p:style>
+          <p:txBody>
+            <a:bodyPr rtlCol="0" anchor="ctr"/>
+            <a:lstStyle/>
+            <a:p>
+              <a:pPr algn="ctr"/>
+              <a:endParaRPr lang="en-US"/>
+            </a:p>
+          </p:txBody>
+        </p:sp>
+        <p:sp>
+          <p:nvSpPr>
+            <p:cNvPr id="199" name="OTLSHAPE_T_5417459faabd473e8e317c8fe7fed1ca_Title"/>
+            <p:cNvSpPr txBox="1"/>
+            <p:nvPr>
+              <p:custDataLst>
+                <p:tags r:id="rId175"/>
+              </p:custDataLst>
+            </p:nvPr>
+          </p:nvSpPr>
+          <p:spPr>
+            <a:xfrm>
+              <a:off x="8395649" y="4551506"/>
+              <a:ext cx="592779" cy="430887"/>
+            </a:xfrm>
+            <a:prstGeom prst="rect">
+              <a:avLst/>
+            </a:prstGeom>
+            <a:noFill/>
+          </p:spPr>
+          <p:txBody>
+            <a:bodyPr vert="horz" wrap="square" lIns="0" tIns="0" rIns="0" bIns="0" rtlCol="0" anchor="ctr" anchorCtr="0">
+              <a:spAutoFit/>
+            </a:bodyPr>
+            <a:lstStyle/>
+            <a:p>
+              <a:pPr algn="ctr"/>
+              <a:r>
+                <a:rPr lang="en-US" sz="700" b="1" spc="-4" dirty="0" smtClean="0">
+                  <a:solidFill>
+                    <a:srgbClr val="00B0F0"/>
+                  </a:solidFill>
+                  <a:latin typeface="Calibri" panose="020F0502020204030204" pitchFamily="34" charset="0"/>
+                </a:rPr>
+                <a:t>March 16</a:t>
+              </a:r>
+              <a:r>
+                <a:rPr lang="en-US" sz="700" b="1" spc="-4" baseline="30000" dirty="0" smtClean="0">
+                  <a:solidFill>
+                    <a:srgbClr val="00B0F0"/>
+                  </a:solidFill>
+                  <a:latin typeface="Calibri" panose="020F0502020204030204" pitchFamily="34" charset="0"/>
+                </a:rPr>
+                <a:t>th</a:t>
+              </a:r>
+              <a:endParaRPr lang="en-US" sz="700" b="1" spc="-4" dirty="0" smtClean="0">
+                <a:solidFill>
+                  <a:srgbClr val="00B0F0"/>
+                </a:solidFill>
+                <a:latin typeface="Calibri" panose="020F0502020204030204" pitchFamily="34" charset="0"/>
+              </a:endParaRPr>
+            </a:p>
+            <a:p>
+              <a:pPr algn="ctr"/>
+              <a:r>
+                <a:rPr lang="en-US" sz="700" b="1" spc="-4" dirty="0" smtClean="0">
+                  <a:solidFill>
+                    <a:srgbClr val="00B0F0"/>
+                  </a:solidFill>
+                  <a:latin typeface="Calibri" panose="020F0502020204030204" pitchFamily="34" charset="0"/>
+                </a:rPr>
+                <a:t>3-5PM @ DSS</a:t>
+              </a:r>
+            </a:p>
+            <a:p>
+              <a:pPr algn="ctr"/>
+              <a:r>
+                <a:rPr lang="en-US" sz="700" b="1" spc="-4" dirty="0" smtClean="0">
+                  <a:solidFill>
+                    <a:srgbClr val="0070C0"/>
+                  </a:solidFill>
+                  <a:latin typeface="Calibri" panose="020F0502020204030204" pitchFamily="34" charset="0"/>
+                </a:rPr>
+                <a:t>Poster Presentation</a:t>
+              </a:r>
+              <a:endParaRPr lang="en-US" sz="700" b="1" spc="-4" dirty="0">
+                <a:solidFill>
+                  <a:srgbClr val="0070C0"/>
+                </a:solidFill>
+                <a:latin typeface="Calibri" panose="020F0502020204030204" pitchFamily="34" charset="0"/>
+              </a:endParaRPr>
+            </a:p>
+          </p:txBody>
+        </p:sp>
       </p:grpSp>
     </p:spTree>
     <p:custDataLst>
@@ -11666,7 +12181,55 @@
 </p:tagLst>
 </file>
 
+<file path=ppt/tags/tag168.xml><?xml version="1.0" encoding="utf-8"?>
+<p:tagLst xmlns:a="http://schemas.openxmlformats.org/drawingml/2006/main" xmlns:r="http://schemas.openxmlformats.org/officeDocument/2006/relationships" xmlns:p="http://schemas.openxmlformats.org/presentationml/2006/main">
+  <p:tag name="OTLMARKERSHAPE" val="OTL"/>
+</p:tagLst>
+</file>
+
+<file path=ppt/tags/tag169.xml><?xml version="1.0" encoding="utf-8"?>
+<p:tagLst xmlns:a="http://schemas.openxmlformats.org/drawingml/2006/main" xmlns:r="http://schemas.openxmlformats.org/officeDocument/2006/relationships" xmlns:p="http://schemas.openxmlformats.org/presentationml/2006/main">
+  <p:tag name="OTLMARKERSHAPE" val="OTL"/>
+</p:tagLst>
+</file>
+
 <file path=ppt/tags/tag17.xml><?xml version="1.0" encoding="utf-8"?>
+<p:tagLst xmlns:a="http://schemas.openxmlformats.org/drawingml/2006/main" xmlns:r="http://schemas.openxmlformats.org/officeDocument/2006/relationships" xmlns:p="http://schemas.openxmlformats.org/presentationml/2006/main">
+  <p:tag name="OTLMARKERSHAPE" val="OTL"/>
+</p:tagLst>
+</file>
+
+<file path=ppt/tags/tag170.xml><?xml version="1.0" encoding="utf-8"?>
+<p:tagLst xmlns:a="http://schemas.openxmlformats.org/drawingml/2006/main" xmlns:r="http://schemas.openxmlformats.org/officeDocument/2006/relationships" xmlns:p="http://schemas.openxmlformats.org/presentationml/2006/main">
+  <p:tag name="OTLMARKERSHAPE" val="OTL"/>
+</p:tagLst>
+</file>
+
+<file path=ppt/tags/tag171.xml><?xml version="1.0" encoding="utf-8"?>
+<p:tagLst xmlns:a="http://schemas.openxmlformats.org/drawingml/2006/main" xmlns:r="http://schemas.openxmlformats.org/officeDocument/2006/relationships" xmlns:p="http://schemas.openxmlformats.org/presentationml/2006/main">
+  <p:tag name="OTLMARKERSHAPE" val="OTL"/>
+</p:tagLst>
+</file>
+
+<file path=ppt/tags/tag172.xml><?xml version="1.0" encoding="utf-8"?>
+<p:tagLst xmlns:a="http://schemas.openxmlformats.org/drawingml/2006/main" xmlns:r="http://schemas.openxmlformats.org/officeDocument/2006/relationships" xmlns:p="http://schemas.openxmlformats.org/presentationml/2006/main">
+  <p:tag name="OTLMARKERSHAPE" val="OTL"/>
+</p:tagLst>
+</file>
+
+<file path=ppt/tags/tag173.xml><?xml version="1.0" encoding="utf-8"?>
+<p:tagLst xmlns:a="http://schemas.openxmlformats.org/drawingml/2006/main" xmlns:r="http://schemas.openxmlformats.org/officeDocument/2006/relationships" xmlns:p="http://schemas.openxmlformats.org/presentationml/2006/main">
+  <p:tag name="OTLMARKERSHAPE" val="OTL"/>
+</p:tagLst>
+</file>
+
+<file path=ppt/tags/tag174.xml><?xml version="1.0" encoding="utf-8"?>
+<p:tagLst xmlns:a="http://schemas.openxmlformats.org/drawingml/2006/main" xmlns:r="http://schemas.openxmlformats.org/officeDocument/2006/relationships" xmlns:p="http://schemas.openxmlformats.org/presentationml/2006/main">
+  <p:tag name="OTLMARKERSHAPE" val="OTL"/>
+</p:tagLst>
+</file>
+
+<file path=ppt/tags/tag175.xml><?xml version="1.0" encoding="utf-8"?>
 <p:tagLst xmlns:a="http://schemas.openxmlformats.org/drawingml/2006/main" xmlns:r="http://schemas.openxmlformats.org/officeDocument/2006/relationships" xmlns:p="http://schemas.openxmlformats.org/presentationml/2006/main">
   <p:tag name="OTLMARKERSHAPE" val="OTL"/>
 </p:tagLst>

</xml_diff>